<commit_message>
Zmieniono przykład pętli iteracyjnej na bardziej pedagogiczny
</commit_message>
<xml_diff>
--- a/Wprowadzenie do algorytmów/I. Wprowadzenie do algorytmów/Algorytmy.pptx
+++ b/Wprowadzenie do algorytmów/I. Wprowadzenie do algorytmów/Algorytmy.pptx
@@ -131,10 +131,6 @@
 </p:presentation>
 </file>
 
-<file path=ppt/revisionInfo.xml><?xml version="1.0" encoding="utf-8"?>
-<p1510:revInfo xmlns:a="http://schemas.openxmlformats.org/drawingml/2006/main" xmlns:r="http://schemas.openxmlformats.org/officeDocument/2006/relationships" xmlns:p1510="http://schemas.microsoft.com/office/powerpoint/2015/10/main"/>
-</file>
-
 <file path=ppt/notesMasters/notesMaster1.xml><?xml version="1.0" encoding="utf-8"?>
 <p:notesMaster xmlns:a="http://schemas.openxmlformats.org/drawingml/2006/main" xmlns:r="http://schemas.openxmlformats.org/officeDocument/2006/relationships" xmlns:p="http://schemas.openxmlformats.org/presentationml/2006/main">
   <p:cSld>
@@ -217,7 +213,7 @@
           <a:p>
             <a:fld id="{FE99C238-BBD4-47FA-ADDF-FFB895C0A193}" type="datetimeFigureOut">
               <a:rPr lang="pl-PL" smtClean="0"/>
-              <a:t>28.08.2017</a:t>
+              <a:t>30.05.2018</a:t>
             </a:fld>
             <a:endParaRPr lang="pl-PL"/>
           </a:p>
@@ -661,7 +657,7 @@
             <a:fld id="{66221E02-25CB-4963-84BC-0813985E7D90}" type="datetimeFigureOut">
               <a:rPr lang="pl-PL" smtClean="0"/>
               <a:pPr/>
-              <a:t>28.08.2017</a:t>
+              <a:t>30.05.2018</a:t>
             </a:fld>
             <a:endParaRPr lang="pl-PL"/>
           </a:p>
@@ -826,7 +822,7 @@
             <a:fld id="{66221E02-25CB-4963-84BC-0813985E7D90}" type="datetimeFigureOut">
               <a:rPr lang="pl-PL" smtClean="0"/>
               <a:pPr/>
-              <a:t>28.08.2017</a:t>
+              <a:t>30.05.2018</a:t>
             </a:fld>
             <a:endParaRPr lang="pl-PL"/>
           </a:p>
@@ -1001,7 +997,7 @@
             <a:fld id="{66221E02-25CB-4963-84BC-0813985E7D90}" type="datetimeFigureOut">
               <a:rPr lang="pl-PL" smtClean="0"/>
               <a:pPr/>
-              <a:t>28.08.2017</a:t>
+              <a:t>30.05.2018</a:t>
             </a:fld>
             <a:endParaRPr lang="pl-PL"/>
           </a:p>
@@ -1166,7 +1162,7 @@
             <a:fld id="{66221E02-25CB-4963-84BC-0813985E7D90}" type="datetimeFigureOut">
               <a:rPr lang="pl-PL" smtClean="0"/>
               <a:pPr/>
-              <a:t>28.08.2017</a:t>
+              <a:t>30.05.2018</a:t>
             </a:fld>
             <a:endParaRPr lang="pl-PL"/>
           </a:p>
@@ -1408,7 +1404,7 @@
             <a:fld id="{66221E02-25CB-4963-84BC-0813985E7D90}" type="datetimeFigureOut">
               <a:rPr lang="pl-PL" smtClean="0"/>
               <a:pPr/>
-              <a:t>28.08.2017</a:t>
+              <a:t>30.05.2018</a:t>
             </a:fld>
             <a:endParaRPr lang="pl-PL"/>
           </a:p>
@@ -1690,7 +1686,7 @@
             <a:fld id="{66221E02-25CB-4963-84BC-0813985E7D90}" type="datetimeFigureOut">
               <a:rPr lang="pl-PL" smtClean="0"/>
               <a:pPr/>
-              <a:t>28.08.2017</a:t>
+              <a:t>30.05.2018</a:t>
             </a:fld>
             <a:endParaRPr lang="pl-PL"/>
           </a:p>
@@ -2106,7 +2102,7 @@
             <a:fld id="{66221E02-25CB-4963-84BC-0813985E7D90}" type="datetimeFigureOut">
               <a:rPr lang="pl-PL" smtClean="0"/>
               <a:pPr/>
-              <a:t>28.08.2017</a:t>
+              <a:t>30.05.2018</a:t>
             </a:fld>
             <a:endParaRPr lang="pl-PL"/>
           </a:p>
@@ -2220,7 +2216,7 @@
             <a:fld id="{66221E02-25CB-4963-84BC-0813985E7D90}" type="datetimeFigureOut">
               <a:rPr lang="pl-PL" smtClean="0"/>
               <a:pPr/>
-              <a:t>28.08.2017</a:t>
+              <a:t>30.05.2018</a:t>
             </a:fld>
             <a:endParaRPr lang="pl-PL"/>
           </a:p>
@@ -2312,7 +2308,7 @@
             <a:fld id="{66221E02-25CB-4963-84BC-0813985E7D90}" type="datetimeFigureOut">
               <a:rPr lang="pl-PL" smtClean="0"/>
               <a:pPr/>
-              <a:t>28.08.2017</a:t>
+              <a:t>30.05.2018</a:t>
             </a:fld>
             <a:endParaRPr lang="pl-PL"/>
           </a:p>
@@ -2584,7 +2580,7 @@
             <a:fld id="{66221E02-25CB-4963-84BC-0813985E7D90}" type="datetimeFigureOut">
               <a:rPr lang="pl-PL" smtClean="0"/>
               <a:pPr/>
-              <a:t>28.08.2017</a:t>
+              <a:t>30.05.2018</a:t>
             </a:fld>
             <a:endParaRPr lang="pl-PL"/>
           </a:p>
@@ -2833,7 +2829,7 @@
             <a:fld id="{66221E02-25CB-4963-84BC-0813985E7D90}" type="datetimeFigureOut">
               <a:rPr lang="pl-PL" smtClean="0"/>
               <a:pPr/>
-              <a:t>28.08.2017</a:t>
+              <a:t>30.05.2018</a:t>
             </a:fld>
             <a:endParaRPr lang="pl-PL"/>
           </a:p>
@@ -3041,7 +3037,7 @@
             <a:fld id="{66221E02-25CB-4963-84BC-0813985E7D90}" type="datetimeFigureOut">
               <a:rPr lang="pl-PL" smtClean="0"/>
               <a:pPr/>
-              <a:t>28.08.2017</a:t>
+              <a:t>30.05.2018</a:t>
             </a:fld>
             <a:endParaRPr lang="pl-PL"/>
           </a:p>
@@ -4769,8 +4765,21 @@
                   <a:srgbClr val="FF0000"/>
                 </a:solidFill>
               </a:rPr>
-              <a:t>Pociągnij Małgosię za warkocz</a:t>
-            </a:r>
+              <a:t>Zgłoś się na ochotnika </a:t>
+            </a:r>
+            <a:r>
+              <a:rPr lang="pl-PL" sz="2400" b="1">
+                <a:solidFill>
+                  <a:srgbClr val="FF0000"/>
+                </a:solidFill>
+              </a:rPr>
+              <a:t>do tablicy</a:t>
+            </a:r>
+            <a:endParaRPr lang="pl-PL" sz="2400" b="1" dirty="0">
+              <a:solidFill>
+                <a:srgbClr val="FF0000"/>
+              </a:solidFill>
+            </a:endParaRPr>
           </a:p>
           <a:p>
             <a:endParaRPr lang="pl-PL" sz="1700" dirty="0"/>

</xml_diff>

<commit_message>
Rozbito przykład z instrukcją warunkową na dwie części
</commit_message>
<xml_diff>
--- a/Wprowadzenie do algorytmów/I. Wprowadzenie do algorytmów/Algorytmy.pptx
+++ b/Wprowadzenie do algorytmów/I. Wprowadzenie do algorytmów/Algorytmy.pptx
@@ -5,15 +5,16 @@
     <p:sldMasterId id="2147483648" r:id="rId1"/>
   </p:sldMasterIdLst>
   <p:notesMasterIdLst>
-    <p:notesMasterId r:id="rId8"/>
+    <p:notesMasterId r:id="rId9"/>
   </p:notesMasterIdLst>
   <p:sldIdLst>
     <p:sldId id="264" r:id="rId2"/>
     <p:sldId id="265" r:id="rId3"/>
-    <p:sldId id="266" r:id="rId4"/>
-    <p:sldId id="267" r:id="rId5"/>
-    <p:sldId id="268" r:id="rId6"/>
-    <p:sldId id="263" r:id="rId7"/>
+    <p:sldId id="269" r:id="rId4"/>
+    <p:sldId id="266" r:id="rId5"/>
+    <p:sldId id="267" r:id="rId6"/>
+    <p:sldId id="268" r:id="rId7"/>
+    <p:sldId id="263" r:id="rId8"/>
   </p:sldIdLst>
   <p:sldSz cx="9144000" cy="6858000" type="screen4x3"/>
   <p:notesSz cx="6858000" cy="9144000"/>
@@ -3805,6 +3806,322 @@
 <file path=ppt/slides/slide2.xml><?xml version="1.0" encoding="utf-8"?>
 <p:sld xmlns:a="http://schemas.openxmlformats.org/drawingml/2006/main" xmlns:r="http://schemas.openxmlformats.org/officeDocument/2006/relationships" xmlns:p="http://schemas.openxmlformats.org/presentationml/2006/main">
   <p:cSld>
+    <p:bg>
+      <p:bgPr>
+        <a:solidFill>
+          <a:schemeClr val="bg1"/>
+        </a:solidFill>
+        <a:effectLst/>
+      </p:bgPr>
+    </p:bg>
+    <p:spTree>
+      <p:nvGrpSpPr>
+        <p:cNvPr id="1" name=""/>
+        <p:cNvGrpSpPr/>
+        <p:nvPr/>
+      </p:nvGrpSpPr>
+      <p:grpSpPr>
+        <a:xfrm>
+          <a:off x="0" y="0"/>
+          <a:ext cx="0" cy="0"/>
+          <a:chOff x="0" y="0"/>
+          <a:chExt cx="0" cy="0"/>
+        </a:xfrm>
+      </p:grpSpPr>
+      <p:pic>
+        <p:nvPicPr>
+          <p:cNvPr id="4" name="Obraz 3">
+            <a:extLst>
+              <a:ext uri="{FF2B5EF4-FFF2-40B4-BE49-F238E27FC236}">
+                <a16:creationId xmlns:a16="http://schemas.microsoft.com/office/drawing/2014/main" id="{7D7BABFB-5F3F-4431-AD16-EE44E64F950A}"/>
+              </a:ext>
+            </a:extLst>
+          </p:cNvPr>
+          <p:cNvPicPr>
+            <a:picLocks noChangeAspect="1"/>
+          </p:cNvPicPr>
+          <p:nvPr/>
+        </p:nvPicPr>
+        <p:blipFill rotWithShape="1">
+          <a:blip r:embed="rId2">
+            <a:extLst>
+              <a:ext uri="{28A0092B-C50C-407E-A947-70E740481C1C}">
+                <a14:useLocalDpi xmlns:a14="http://schemas.microsoft.com/office/drawing/2010/main" val="0"/>
+              </a:ext>
+            </a:extLst>
+          </a:blip>
+          <a:srcRect l="10517" r="13536"/>
+          <a:stretch/>
+        </p:blipFill>
+        <p:spPr>
+          <a:xfrm>
+            <a:off x="20" y="10"/>
+            <a:ext cx="3476673" cy="6857990"/>
+          </a:xfrm>
+          <a:prstGeom prst="rect">
+            <a:avLst/>
+          </a:prstGeom>
+          <a:effectLst/>
+        </p:spPr>
+      </p:pic>
+      <p:cxnSp>
+        <p:nvCxnSpPr>
+          <p:cNvPr id="19" name="Straight Connector 18">
+            <a:extLst>
+              <a:ext uri="{FF2B5EF4-FFF2-40B4-BE49-F238E27FC236}">
+                <a16:creationId xmlns:a16="http://schemas.microsoft.com/office/drawing/2014/main" id="{A7F400EE-A8A5-48AF-B4D6-291B52C6F0B0}"/>
+              </a:ext>
+              <a:ext uri="{C183D7F6-B498-43B3-948B-1728B52AA6E4}">
+                <adec:decorative xmlns:adec="http://schemas.microsoft.com/office/drawing/2017/decorative" val="1"/>
+              </a:ext>
+            </a:extLst>
+          </p:cNvPr>
+          <p:cNvCxnSpPr>
+            <a:cxnSpLocks noGrp="1" noRot="1" noChangeAspect="1" noMove="1" noResize="1" noEditPoints="1" noAdjustHandles="1" noChangeArrowheads="1" noChangeShapeType="1"/>
+          </p:cNvCxnSpPr>
+          <p:nvPr>
+            <p:extLst>
+              <p:ext uri="{386F3935-93C4-4BCD-93E2-E3B085C9AB24}">
+                <p16:designElem xmlns:p16="http://schemas.microsoft.com/office/powerpoint/2015/main" val="1"/>
+              </p:ext>
+            </p:extLst>
+          </p:nvPr>
+        </p:nvCxnSpPr>
+        <p:spPr>
+          <a:xfrm>
+            <a:off x="3810700" y="2115117"/>
+            <a:ext cx="4732020" cy="0"/>
+          </a:xfrm>
+          <a:prstGeom prst="line">
+            <a:avLst/>
+          </a:prstGeom>
+          <a:ln>
+            <a:solidFill>
+              <a:srgbClr val="52E9ED"/>
+            </a:solidFill>
+          </a:ln>
+        </p:spPr>
+        <p:style>
+          <a:lnRef idx="1">
+            <a:schemeClr val="accent1"/>
+          </a:lnRef>
+          <a:fillRef idx="0">
+            <a:schemeClr val="accent1"/>
+          </a:fillRef>
+          <a:effectRef idx="0">
+            <a:schemeClr val="accent1"/>
+          </a:effectRef>
+          <a:fontRef idx="minor">
+            <a:schemeClr val="tx1"/>
+          </a:fontRef>
+        </p:style>
+      </p:cxnSp>
+      <p:sp>
+        <p:nvSpPr>
+          <p:cNvPr id="2" name="Tytuł 1">
+            <a:extLst>
+              <a:ext uri="{FF2B5EF4-FFF2-40B4-BE49-F238E27FC236}">
+                <a16:creationId xmlns:a16="http://schemas.microsoft.com/office/drawing/2014/main" id="{9D3F7114-0071-4902-B958-44EF186FCAE9}"/>
+              </a:ext>
+            </a:extLst>
+          </p:cNvPr>
+          <p:cNvSpPr>
+            <a:spLocks noGrp="1"/>
+          </p:cNvSpPr>
+          <p:nvPr>
+            <p:ph type="title"/>
+          </p:nvPr>
+        </p:nvSpPr>
+        <p:spPr>
+          <a:xfrm>
+            <a:off x="3724072" y="629268"/>
+            <a:ext cx="4939868" cy="1286160"/>
+          </a:xfrm>
+        </p:spPr>
+        <p:txBody>
+          <a:bodyPr anchor="b">
+            <a:normAutofit fontScale="90000"/>
+          </a:bodyPr>
+          <a:lstStyle/>
+          <a:p>
+            <a:pPr>
+              <a:lnSpc>
+                <a:spcPct val="90000"/>
+              </a:lnSpc>
+            </a:pPr>
+            <a:r>
+              <a:rPr lang="pl-PL" sz="4100" b="1" dirty="0"/>
+              <a:t>Algorytm z prostą instrukcją warunkową</a:t>
+            </a:r>
+          </a:p>
+        </p:txBody>
+      </p:sp>
+      <p:sp>
+        <p:nvSpPr>
+          <p:cNvPr id="3" name="Symbol zastępczy zawartości 2">
+            <a:extLst>
+              <a:ext uri="{FF2B5EF4-FFF2-40B4-BE49-F238E27FC236}">
+                <a16:creationId xmlns:a16="http://schemas.microsoft.com/office/drawing/2014/main" id="{AAF3B534-9E96-46D3-980D-5CB2AAE9AA51}"/>
+              </a:ext>
+            </a:extLst>
+          </p:cNvPr>
+          <p:cNvSpPr>
+            <a:spLocks noGrp="1"/>
+          </p:cNvSpPr>
+          <p:nvPr>
+            <p:ph idx="1"/>
+          </p:nvPr>
+        </p:nvSpPr>
+        <p:spPr>
+          <a:xfrm>
+            <a:off x="3724073" y="2438400"/>
+            <a:ext cx="4939867" cy="3785419"/>
+          </a:xfrm>
+        </p:spPr>
+        <p:txBody>
+          <a:bodyPr>
+            <a:normAutofit/>
+          </a:bodyPr>
+          <a:lstStyle/>
+          <a:p>
+            <a:pPr marL="0" indent="0">
+              <a:buNone/>
+            </a:pPr>
+            <a:r>
+              <a:rPr lang="pl-PL" sz="2400" b="1" dirty="0"/>
+              <a:t>Jeśli</a:t>
+            </a:r>
+            <a:r>
+              <a:rPr lang="pl-PL" sz="2400" dirty="0"/>
+              <a:t> </a:t>
+            </a:r>
+            <a:r>
+              <a:rPr lang="pl-PL" sz="2400" i="1" dirty="0"/>
+              <a:t>światło zielone </a:t>
+            </a:r>
+            <a:r>
+              <a:rPr lang="pl-PL" sz="2400" b="1" dirty="0">
+                <a:solidFill>
+                  <a:srgbClr val="FF0000"/>
+                </a:solidFill>
+              </a:rPr>
+              <a:t>idź</a:t>
+            </a:r>
+            <a:r>
+              <a:rPr lang="pl-PL" sz="2400" b="1" dirty="0"/>
+              <a:t>.</a:t>
+            </a:r>
+          </a:p>
+          <a:p>
+            <a:pPr marL="0" indent="0">
+              <a:buNone/>
+            </a:pPr>
+            <a:r>
+              <a:rPr lang="pl-PL" sz="2400" b="1" dirty="0"/>
+              <a:t>Jeśli</a:t>
+            </a:r>
+            <a:r>
+              <a:rPr lang="pl-PL" sz="2400" dirty="0"/>
+              <a:t> </a:t>
+            </a:r>
+            <a:r>
+              <a:rPr lang="pl-PL" sz="2400" i="1" dirty="0"/>
+              <a:t>światło czerwone </a:t>
+            </a:r>
+            <a:r>
+              <a:rPr lang="pl-PL" sz="2400" b="1" dirty="0">
+                <a:solidFill>
+                  <a:srgbClr val="FF0000"/>
+                </a:solidFill>
+              </a:rPr>
+              <a:t>stój</a:t>
+            </a:r>
+            <a:r>
+              <a:rPr lang="pl-PL" sz="2400" b="1" dirty="0"/>
+              <a:t>.</a:t>
+            </a:r>
+          </a:p>
+          <a:p>
+            <a:endParaRPr lang="pl-PL" sz="2400" b="1" dirty="0"/>
+          </a:p>
+          <a:p>
+            <a:pPr marL="0" indent="0">
+              <a:buNone/>
+            </a:pPr>
+            <a:endParaRPr lang="pl-PL" sz="2400" dirty="0"/>
+          </a:p>
+          <a:p>
+            <a:pPr marL="0" indent="0">
+              <a:buNone/>
+            </a:pPr>
+            <a:endParaRPr lang="pl-PL" sz="2400" dirty="0"/>
+          </a:p>
+          <a:p>
+            <a:pPr marL="0" indent="0">
+              <a:buNone/>
+            </a:pPr>
+            <a:r>
+              <a:rPr lang="pl-PL" sz="2400" b="1" dirty="0"/>
+              <a:t>Jeśli</a:t>
+            </a:r>
+            <a:r>
+              <a:rPr lang="pl-PL" sz="2400" dirty="0"/>
+              <a:t> </a:t>
+            </a:r>
+            <a:r>
+              <a:rPr lang="pl-PL" sz="2400" i="1" dirty="0"/>
+              <a:t>światło zielone </a:t>
+            </a:r>
+            <a:r>
+              <a:rPr lang="pl-PL" sz="2400" b="1" dirty="0">
+                <a:solidFill>
+                  <a:srgbClr val="FF0000"/>
+                </a:solidFill>
+              </a:rPr>
+              <a:t>idź</a:t>
+            </a:r>
+            <a:r>
+              <a:rPr lang="pl-PL" sz="2400" dirty="0"/>
+              <a:t>, </a:t>
+            </a:r>
+            <a:br>
+              <a:rPr lang="pl-PL" sz="2400" dirty="0"/>
+            </a:br>
+            <a:r>
+              <a:rPr lang="pl-PL" sz="2400" b="1" dirty="0"/>
+              <a:t>w przeciwnym przypadku </a:t>
+            </a:r>
+            <a:r>
+              <a:rPr lang="pl-PL" sz="2400" b="1" dirty="0">
+                <a:solidFill>
+                  <a:srgbClr val="FF0000"/>
+                </a:solidFill>
+              </a:rPr>
+              <a:t>stój</a:t>
+            </a:r>
+            <a:r>
+              <a:rPr lang="pl-PL" sz="2400" b="1" dirty="0"/>
+              <a:t>.</a:t>
+            </a:r>
+          </a:p>
+        </p:txBody>
+      </p:sp>
+    </p:spTree>
+    <p:extLst>
+      <p:ext uri="{BB962C8B-B14F-4D97-AF65-F5344CB8AC3E}">
+        <p14:creationId xmlns:p14="http://schemas.microsoft.com/office/powerpoint/2010/main" val="1230619321"/>
+      </p:ext>
+    </p:extLst>
+  </p:cSld>
+  <p:clrMapOvr>
+    <a:masterClrMapping/>
+  </p:clrMapOvr>
+</p:sld>
+</file>
+
+<file path=ppt/slides/slide3.xml><?xml version="1.0" encoding="utf-8"?>
+<p:sld xmlns:a="http://schemas.openxmlformats.org/drawingml/2006/main" xmlns:r="http://schemas.openxmlformats.org/officeDocument/2006/relationships" xmlns:p="http://schemas.openxmlformats.org/presentationml/2006/main">
+  <p:cSld>
     <p:spTree>
       <p:nvGrpSpPr>
         <p:cNvPr id="1" name=""/>
@@ -3925,7 +4242,7 @@
         </p:spPr>
         <p:txBody>
           <a:bodyPr anchor="b">
-            <a:normAutofit/>
+            <a:normAutofit fontScale="90000"/>
           </a:bodyPr>
           <a:lstStyle/>
           <a:p>
@@ -3936,7 +4253,7 @@
             </a:pPr>
             <a:r>
               <a:rPr lang="pl-PL" sz="4100" b="1" dirty="0"/>
-              <a:t>Algorytm z instrukcją warunkową</a:t>
+              <a:t>Algorytm ze złożoną instrukcją warunkową</a:t>
             </a:r>
           </a:p>
         </p:txBody>
@@ -3965,7 +4282,7 @@
         </p:spPr>
         <p:txBody>
           <a:bodyPr>
-            <a:normAutofit/>
+            <a:normAutofit fontScale="77500" lnSpcReduction="20000"/>
           </a:bodyPr>
           <a:lstStyle/>
           <a:p>
@@ -3973,19 +4290,19 @@
               <a:buNone/>
             </a:pPr>
             <a:r>
-              <a:rPr lang="pl-PL" sz="2400" b="1" dirty="0"/>
+              <a:rPr lang="pl-PL" sz="2800" b="1" dirty="0"/>
               <a:t>Jeśli</a:t>
             </a:r>
             <a:r>
-              <a:rPr lang="pl-PL" sz="2400" dirty="0"/>
+              <a:rPr lang="pl-PL" sz="2800" dirty="0"/>
               <a:t> </a:t>
             </a:r>
             <a:r>
-              <a:rPr lang="pl-PL" sz="2400" i="1" dirty="0"/>
+              <a:rPr lang="pl-PL" sz="2800" i="1" dirty="0"/>
               <a:t>światło zielone </a:t>
             </a:r>
             <a:r>
-              <a:rPr lang="pl-PL" sz="2400" b="1" dirty="0">
+              <a:rPr lang="pl-PL" sz="2800" b="1" dirty="0">
                 <a:solidFill>
                   <a:srgbClr val="FF0000"/>
                 </a:solidFill>
@@ -3993,8 +4310,8 @@
               <a:t>idź</a:t>
             </a:r>
             <a:r>
-              <a:rPr lang="pl-PL" sz="2400" b="1" dirty="0"/>
-              <a:t>.</a:t>
+              <a:rPr lang="pl-PL" sz="2800" dirty="0"/>
+              <a:t>,</a:t>
             </a:r>
           </a:p>
           <a:p>
@@ -4002,19 +4319,50 @@
               <a:buNone/>
             </a:pPr>
             <a:r>
-              <a:rPr lang="pl-PL" sz="2400" b="1" dirty="0"/>
-              <a:t>Jeśli</a:t>
-            </a:r>
-            <a:r>
-              <a:rPr lang="pl-PL" sz="2400" dirty="0"/>
+              <a:rPr lang="pl-PL" sz="2800" b="1" dirty="0"/>
+              <a:t>w przeciwnym przypadku, jeśli </a:t>
+            </a:r>
+            <a:br>
+              <a:rPr lang="pl-PL" sz="2800" b="1" dirty="0"/>
+            </a:br>
+            <a:r>
+              <a:rPr lang="pl-PL" sz="2800" i="1" dirty="0"/>
+              <a:t>światło żółte </a:t>
+            </a:r>
+            <a:r>
+              <a:rPr lang="pl-PL" sz="2800" b="1" dirty="0">
+                <a:solidFill>
+                  <a:srgbClr val="FF0000"/>
+                </a:solidFill>
+              </a:rPr>
+              <a:t>czekaj</a:t>
+            </a:r>
+            <a:r>
+              <a:rPr lang="pl-PL" sz="2800" dirty="0"/>
+              <a:t>,</a:t>
+            </a:r>
+          </a:p>
+          <a:p>
+            <a:pPr marL="0" indent="0">
+              <a:buNone/>
+            </a:pPr>
+            <a:r>
+              <a:rPr lang="pl-PL" sz="2800" b="1" dirty="0"/>
+              <a:t>w przeciwnym przypadku, jeśli</a:t>
+            </a:r>
+            <a:r>
+              <a:rPr lang="pl-PL" sz="2800" dirty="0"/>
               <a:t> </a:t>
             </a:r>
-            <a:r>
-              <a:rPr lang="pl-PL" sz="2400" i="1" dirty="0"/>
+            <a:br>
+              <a:rPr lang="pl-PL" sz="2800" dirty="0"/>
+            </a:br>
+            <a:r>
+              <a:rPr lang="pl-PL" sz="2800" i="1" dirty="0"/>
               <a:t>światło czerwone </a:t>
             </a:r>
             <a:r>
-              <a:rPr lang="pl-PL" sz="2400" b="1" dirty="0">
+              <a:rPr lang="pl-PL" sz="2800" b="1" dirty="0">
                 <a:solidFill>
                   <a:srgbClr val="FF0000"/>
                 </a:solidFill>
@@ -4022,43 +4370,37 @@
               <a:t>stój</a:t>
             </a:r>
             <a:r>
-              <a:rPr lang="pl-PL" sz="2400" b="1" dirty="0"/>
+              <a:rPr lang="pl-PL" sz="2800" b="1" dirty="0"/>
               <a:t>.</a:t>
             </a:r>
           </a:p>
           <a:p>
-            <a:endParaRPr lang="pl-PL" sz="2400" b="1" dirty="0"/>
+            <a:endParaRPr lang="pl-PL" sz="2800" b="1" dirty="0"/>
           </a:p>
           <a:p>
             <a:pPr marL="0" indent="0">
               <a:buNone/>
             </a:pPr>
-            <a:endParaRPr lang="pl-PL" sz="2400" dirty="0"/>
+            <a:endParaRPr lang="pl-PL" sz="2800" dirty="0"/>
           </a:p>
           <a:p>
             <a:pPr marL="0" indent="0">
               <a:buNone/>
             </a:pPr>
-            <a:endParaRPr lang="pl-PL" sz="2400" dirty="0"/>
-          </a:p>
-          <a:p>
-            <a:pPr marL="0" indent="0">
-              <a:buNone/>
-            </a:pPr>
-            <a:r>
-              <a:rPr lang="pl-PL" sz="2400" b="1" dirty="0"/>
+            <a:r>
+              <a:rPr lang="pl-PL" sz="2800" b="1" dirty="0"/>
               <a:t>Jeśli</a:t>
             </a:r>
             <a:r>
-              <a:rPr lang="pl-PL" sz="2400" dirty="0"/>
+              <a:rPr lang="pl-PL" sz="2800" dirty="0"/>
               <a:t> </a:t>
             </a:r>
             <a:r>
-              <a:rPr lang="pl-PL" sz="2400" i="1" dirty="0"/>
+              <a:rPr lang="pl-PL" sz="2800" i="1" dirty="0"/>
               <a:t>światło zielone </a:t>
             </a:r>
             <a:r>
-              <a:rPr lang="pl-PL" sz="2400" b="1" dirty="0">
+              <a:rPr lang="pl-PL" sz="2800" b="1" dirty="0">
                 <a:solidFill>
                   <a:srgbClr val="FF0000"/>
                 </a:solidFill>
@@ -4066,18 +4408,52 @@
               <a:t>idź</a:t>
             </a:r>
             <a:r>
-              <a:rPr lang="pl-PL" sz="2400" dirty="0"/>
-              <a:t>, </a:t>
+              <a:rPr lang="pl-PL" sz="2800" dirty="0"/>
+              <a:t>,</a:t>
+            </a:r>
+          </a:p>
+          <a:p>
+            <a:pPr marL="0" indent="0">
+              <a:buNone/>
+            </a:pPr>
+            <a:r>
+              <a:rPr lang="pl-PL" sz="2800" b="1" dirty="0"/>
+              <a:t>w przeciwnym przypadku, jeśli </a:t>
             </a:r>
             <a:br>
-              <a:rPr lang="pl-PL" sz="2400" dirty="0"/>
+              <a:rPr lang="pl-PL" sz="2800" b="1" dirty="0"/>
             </a:br>
             <a:r>
-              <a:rPr lang="pl-PL" sz="2400" b="1" dirty="0"/>
-              <a:t>w przeciwnym przypadku </a:t>
-            </a:r>
-            <a:r>
-              <a:rPr lang="pl-PL" sz="2400" b="1" dirty="0">
+              <a:rPr lang="pl-PL" sz="2800" i="1" dirty="0"/>
+              <a:t>światło żółte </a:t>
+            </a:r>
+            <a:r>
+              <a:rPr lang="pl-PL" sz="2800" b="1" dirty="0">
+                <a:solidFill>
+                  <a:srgbClr val="FF0000"/>
+                </a:solidFill>
+              </a:rPr>
+              <a:t>czekaj</a:t>
+            </a:r>
+            <a:r>
+              <a:rPr lang="pl-PL" sz="2800" dirty="0"/>
+              <a:t>,</a:t>
+            </a:r>
+          </a:p>
+          <a:p>
+            <a:pPr marL="0" indent="0">
+              <a:buNone/>
+            </a:pPr>
+            <a:r>
+              <a:rPr lang="pl-PL" sz="2800" b="1" dirty="0"/>
+              <a:t>w przeciwnym przypadku</a:t>
+            </a:r>
+            <a:r>
+              <a:rPr lang="pl-PL" sz="2800" i="1" dirty="0"/>
+              <a:t> </a:t>
+            </a:r>
+            <a:r>
+              <a:rPr lang="pl-PL" sz="2800" b="1" dirty="0">
                 <a:solidFill>
                   <a:srgbClr val="FF0000"/>
                 </a:solidFill>
@@ -4085,7 +4461,7 @@
               <a:t>stój</a:t>
             </a:r>
             <a:r>
-              <a:rPr lang="pl-PL" sz="2400" b="1" dirty="0"/>
+              <a:rPr lang="pl-PL" sz="2800" b="1" dirty="0"/>
               <a:t>.</a:t>
             </a:r>
           </a:p>
@@ -4103,7 +4479,7 @@
     </p:spTree>
     <p:extLst>
       <p:ext uri="{BB962C8B-B14F-4D97-AF65-F5344CB8AC3E}">
-        <p14:creationId xmlns:p14="http://schemas.microsoft.com/office/powerpoint/2010/main" val="1230619321"/>
+        <p14:creationId xmlns:p14="http://schemas.microsoft.com/office/powerpoint/2010/main" val="274292590"/>
       </p:ext>
     </p:extLst>
   </p:cSld>
@@ -4113,7 +4489,7 @@
 </p:sld>
 </file>
 
-<file path=ppt/slides/slide3.xml><?xml version="1.0" encoding="utf-8"?>
+<file path=ppt/slides/slide4.xml><?xml version="1.0" encoding="utf-8"?>
 <p:sld xmlns:a="http://schemas.openxmlformats.org/drawingml/2006/main" xmlns:r="http://schemas.openxmlformats.org/officeDocument/2006/relationships" xmlns:p="http://schemas.openxmlformats.org/presentationml/2006/main">
   <p:cSld>
     <p:spTree>
@@ -4352,7 +4728,7 @@
 </p:sld>
 </file>
 
-<file path=ppt/slides/slide4.xml><?xml version="1.0" encoding="utf-8"?>
+<file path=ppt/slides/slide5.xml><?xml version="1.0" encoding="utf-8"?>
 <p:sld xmlns:a="http://schemas.openxmlformats.org/drawingml/2006/main" xmlns:r="http://schemas.openxmlformats.org/officeDocument/2006/relationships" xmlns:p="http://schemas.openxmlformats.org/presentationml/2006/main">
   <p:cSld>
     <p:spTree>
@@ -4603,7 +4979,7 @@
 </p:sld>
 </file>
 
-<file path=ppt/slides/slide5.xml><?xml version="1.0" encoding="utf-8"?>
+<file path=ppt/slides/slide6.xml><?xml version="1.0" encoding="utf-8"?>
 <p:sld xmlns:a="http://schemas.openxmlformats.org/drawingml/2006/main" xmlns:r="http://schemas.openxmlformats.org/officeDocument/2006/relationships" xmlns:p="http://schemas.openxmlformats.org/presentationml/2006/main">
   <p:cSld>
     <p:spTree>
@@ -4765,21 +5141,8 @@
                   <a:srgbClr val="FF0000"/>
                 </a:solidFill>
               </a:rPr>
-              <a:t>Zgłoś się na ochotnika </a:t>
-            </a:r>
-            <a:r>
-              <a:rPr lang="pl-PL" sz="2400" b="1">
-                <a:solidFill>
-                  <a:srgbClr val="FF0000"/>
-                </a:solidFill>
-              </a:rPr>
-              <a:t>do tablicy</a:t>
-            </a:r>
-            <a:endParaRPr lang="pl-PL" sz="2400" b="1" dirty="0">
-              <a:solidFill>
-                <a:srgbClr val="FF0000"/>
-              </a:solidFill>
-            </a:endParaRPr>
+              <a:t>Zgłoś się na ochotnika do tablicy</a:t>
+            </a:r>
           </a:p>
           <a:p>
             <a:endParaRPr lang="pl-PL" sz="1700" dirty="0"/>
@@ -4924,7 +5287,7 @@
 </p:sld>
 </file>
 
-<file path=ppt/slides/slide6.xml><?xml version="1.0" encoding="utf-8"?>
+<file path=ppt/slides/slide7.xml><?xml version="1.0" encoding="utf-8"?>
 <p:sld xmlns:a="http://schemas.openxmlformats.org/drawingml/2006/main" xmlns:r="http://schemas.openxmlformats.org/officeDocument/2006/relationships" xmlns:p="http://schemas.openxmlformats.org/presentationml/2006/main">
   <p:cSld>
     <p:spTree>
@@ -4988,7 +5351,7 @@
         <p:spPr/>
         <p:txBody>
           <a:bodyPr>
-            <a:normAutofit lnSpcReduction="10000"/>
+            <a:normAutofit fontScale="85000" lnSpcReduction="20000"/>
           </a:bodyPr>
           <a:lstStyle/>
           <a:p>
@@ -5033,6 +5396,15 @@
                 <a:hlinkClick r:id="rId6"/>
               </a:rPr>
               <a:t>https://pixabay.com/en/tea-beverage-cubes-sugar-cup-153014/</a:t>
+            </a:r>
+            <a:endParaRPr lang="pl-PL" i="1" dirty="0"/>
+          </a:p>
+          <a:p>
+            <a:r>
+              <a:rPr lang="pl-PL" i="1" dirty="0">
+                <a:hlinkClick r:id="rId7"/>
+              </a:rPr>
+              <a:t>https://pixabay.com/pl/little-green-man-%C5%9Bwiat%C5%82a-zielony-2871900/</a:t>
             </a:r>
             <a:endParaRPr lang="pl-PL" i="1" dirty="0"/>
           </a:p>

</xml_diff>

<commit_message>
Poprawiono przykład z instrukcją warunkową
</commit_message>
<xml_diff>
--- a/Wprowadzenie do algorytmów/I. Wprowadzenie do algorytmów/Algorytmy.pptx
+++ b/Wprowadzenie do algorytmów/I. Wprowadzenie do algorytmów/Algorytmy.pptx
@@ -4335,7 +4335,7 @@
                   <a:srgbClr val="FF0000"/>
                 </a:solidFill>
               </a:rPr>
-              <a:t>czekaj</a:t>
+              <a:t>czekaj w gotowości</a:t>
             </a:r>
             <a:r>
               <a:rPr lang="pl-PL" sz="2800" dirty="0"/>
@@ -4433,7 +4433,7 @@
                   <a:srgbClr val="FF0000"/>
                 </a:solidFill>
               </a:rPr>
-              <a:t>czekaj</a:t>
+              <a:t>czekaj w gotowości</a:t>
             </a:r>
             <a:r>
               <a:rPr lang="pl-PL" sz="2800" dirty="0"/>

</xml_diff>

<commit_message>
Dodano komentarze do prezentacji wprowadzającej do algorytmów
</commit_message>
<xml_diff>
--- a/Wprowadzenie do algorytmów/I. Wprowadzenie do algorytmów/Algorytmy.pptx
+++ b/Wprowadzenie do algorytmów/I. Wprowadzenie do algorytmów/Algorytmy.pptx
@@ -214,7 +214,7 @@
           <a:p>
             <a:fld id="{FE99C238-BBD4-47FA-ADDF-FFB895C0A193}" type="datetimeFigureOut">
               <a:rPr lang="pl-PL" smtClean="0"/>
-              <a:t>30.05.2018</a:t>
+              <a:t>21.06.2018</a:t>
             </a:fld>
             <a:endParaRPr lang="pl-PL"/>
           </a:p>
@@ -478,6 +478,600 @@
 </p:notesMaster>
 </file>
 
+<file path=ppt/notesSlides/notesSlide1.xml><?xml version="1.0" encoding="utf-8"?>
+<p:notes xmlns:a="http://schemas.openxmlformats.org/drawingml/2006/main" xmlns:r="http://schemas.openxmlformats.org/officeDocument/2006/relationships" xmlns:p="http://schemas.openxmlformats.org/presentationml/2006/main">
+  <p:cSld>
+    <p:spTree>
+      <p:nvGrpSpPr>
+        <p:cNvPr id="1" name=""/>
+        <p:cNvGrpSpPr/>
+        <p:nvPr/>
+      </p:nvGrpSpPr>
+      <p:grpSpPr>
+        <a:xfrm>
+          <a:off x="0" y="0"/>
+          <a:ext cx="0" cy="0"/>
+          <a:chOff x="0" y="0"/>
+          <a:chExt cx="0" cy="0"/>
+        </a:xfrm>
+      </p:grpSpPr>
+      <p:sp>
+        <p:nvSpPr>
+          <p:cNvPr id="2" name="Symbol zastępczy obrazu slajdu 1"/>
+          <p:cNvSpPr>
+            <a:spLocks noGrp="1" noRot="1" noChangeAspect="1"/>
+          </p:cNvSpPr>
+          <p:nvPr>
+            <p:ph type="sldImg"/>
+          </p:nvPr>
+        </p:nvSpPr>
+        <p:spPr/>
+      </p:sp>
+      <p:sp>
+        <p:nvSpPr>
+          <p:cNvPr id="3" name="Symbol zastępczy notatek 2"/>
+          <p:cNvSpPr>
+            <a:spLocks noGrp="1"/>
+          </p:cNvSpPr>
+          <p:nvPr>
+            <p:ph type="body" idx="1"/>
+          </p:nvPr>
+        </p:nvSpPr>
+        <p:spPr/>
+        <p:txBody>
+          <a:bodyPr/>
+          <a:lstStyle/>
+          <a:p>
+            <a:r>
+              <a:rPr lang="pl-PL" dirty="0"/>
+              <a:t>[Pytamy uczniów, czy wiedzą, co to jest algorytm]</a:t>
+            </a:r>
+          </a:p>
+          <a:p>
+            <a:r>
+              <a:rPr lang="pl-PL" dirty="0"/>
+              <a:t>Algorytm to instrukcja wykonania określonego zadania, lub rozwiązania danego problemu. Algorytm powinien jasno opisywać, co należy zrobić, by dojść do rozwiązania.</a:t>
+            </a:r>
+          </a:p>
+          <a:p>
+            <a:r>
+              <a:rPr lang="pl-PL" dirty="0"/>
+              <a:t>Algorytm liniowy to taki, w którym wykonujemy polecenia krok po kroku, jedno po drugim. Przykładem prostego algorytmu liniowego może być przepis.</a:t>
+            </a:r>
+          </a:p>
+          <a:p>
+            <a:r>
+              <a:rPr lang="pl-PL" dirty="0"/>
+              <a:t>Jednym ze sposobów zapisu algorytmu jest lista kroków. Jak widzimy, przepis na pierniczki można przedstawić właśnie za pomocą listy kroków. Lista ta opisuje nam co mamy zrobić i w jakiej kolejności.</a:t>
+            </a:r>
+          </a:p>
+          <a:p>
+            <a:r>
+              <a:rPr lang="pl-PL" dirty="0"/>
+              <a:t>[Pytamy uczniów o przykłady algorytmów liniowych]</a:t>
+            </a:r>
+          </a:p>
+        </p:txBody>
+      </p:sp>
+      <p:sp>
+        <p:nvSpPr>
+          <p:cNvPr id="4" name="Symbol zastępczy numeru slajdu 3"/>
+          <p:cNvSpPr>
+            <a:spLocks noGrp="1"/>
+          </p:cNvSpPr>
+          <p:nvPr>
+            <p:ph type="sldNum" sz="quarter" idx="10"/>
+          </p:nvPr>
+        </p:nvSpPr>
+        <p:spPr/>
+        <p:txBody>
+          <a:bodyPr/>
+          <a:lstStyle/>
+          <a:p>
+            <a:fld id="{3E76F650-3CB8-47FC-976C-2A9F6850CF71}" type="slidenum">
+              <a:rPr lang="pl-PL" smtClean="0"/>
+              <a:t>1</a:t>
+            </a:fld>
+            <a:endParaRPr lang="pl-PL"/>
+          </a:p>
+        </p:txBody>
+      </p:sp>
+    </p:spTree>
+    <p:extLst>
+      <p:ext uri="{BB962C8B-B14F-4D97-AF65-F5344CB8AC3E}">
+        <p14:creationId xmlns:p14="http://schemas.microsoft.com/office/powerpoint/2010/main" val="1410524352"/>
+      </p:ext>
+    </p:extLst>
+  </p:cSld>
+  <p:clrMapOvr>
+    <a:masterClrMapping/>
+  </p:clrMapOvr>
+</p:notes>
+</file>
+
+<file path=ppt/notesSlides/notesSlide2.xml><?xml version="1.0" encoding="utf-8"?>
+<p:notes xmlns:a="http://schemas.openxmlformats.org/drawingml/2006/main" xmlns:r="http://schemas.openxmlformats.org/officeDocument/2006/relationships" xmlns:p="http://schemas.openxmlformats.org/presentationml/2006/main">
+  <p:cSld>
+    <p:spTree>
+      <p:nvGrpSpPr>
+        <p:cNvPr id="1" name=""/>
+        <p:cNvGrpSpPr/>
+        <p:nvPr/>
+      </p:nvGrpSpPr>
+      <p:grpSpPr>
+        <a:xfrm>
+          <a:off x="0" y="0"/>
+          <a:ext cx="0" cy="0"/>
+          <a:chOff x="0" y="0"/>
+          <a:chExt cx="0" cy="0"/>
+        </a:xfrm>
+      </p:grpSpPr>
+      <p:sp>
+        <p:nvSpPr>
+          <p:cNvPr id="2" name="Symbol zastępczy obrazu slajdu 1"/>
+          <p:cNvSpPr>
+            <a:spLocks noGrp="1" noRot="1" noChangeAspect="1"/>
+          </p:cNvSpPr>
+          <p:nvPr>
+            <p:ph type="sldImg"/>
+          </p:nvPr>
+        </p:nvSpPr>
+        <p:spPr/>
+      </p:sp>
+      <p:sp>
+        <p:nvSpPr>
+          <p:cNvPr id="3" name="Symbol zastępczy notatek 2"/>
+          <p:cNvSpPr>
+            <a:spLocks noGrp="1"/>
+          </p:cNvSpPr>
+          <p:nvPr>
+            <p:ph type="body" idx="1"/>
+          </p:nvPr>
+        </p:nvSpPr>
+        <p:spPr/>
+        <p:txBody>
+          <a:bodyPr/>
+          <a:lstStyle/>
+          <a:p>
+            <a:r>
+              <a:rPr lang="pl-PL" dirty="0"/>
+              <a:t>Instrukcja warunkowa pozwala nam powiedzieć, że dana instrukcja ma zostać wykonana tylko wtedy, jeżeli podany warunek jest spełniony. </a:t>
+            </a:r>
+          </a:p>
+          <a:p>
+            <a:r>
+              <a:rPr lang="pl-PL" dirty="0"/>
+              <a:t>Np. jeżeli na skrzyżowaniu zaświeci się dla nas zielone światło, to należy iść. Taki zapis mówi nam, że polecenie idź mamy wykonać wyłącznie wtedy, gdy światło jest zielone.</a:t>
+            </a:r>
+          </a:p>
+          <a:p>
+            <a:r>
+              <a:rPr lang="pl-PL" dirty="0"/>
+              <a:t>Podobnie możemy określić zachowanie dla światła czerwonego.</a:t>
+            </a:r>
+          </a:p>
+          <a:p>
+            <a:endParaRPr lang="pl-PL" dirty="0"/>
+          </a:p>
+          <a:p>
+            <a:r>
+              <a:rPr lang="pl-PL" dirty="0"/>
+              <a:t>Instrukcje warunkowe możemy zapisać na kilka sposobów. Pierwszy zapis to zapis uproszczony, w którym określamy jakie polecenie ma zostać wykonane dla danego warunku.</a:t>
+            </a:r>
+          </a:p>
+          <a:p>
+            <a:r>
+              <a:rPr lang="pl-PL" dirty="0"/>
+              <a:t>Poniżej widzimy zapis rozszerzony. W ten sposób możemy powiedzieć, że mamy iść tylko wtedy, gdy światło jest zielone. A gdy światło będzie miało jakikolwiek inny kolor, mamy stać.</a:t>
+            </a:r>
+          </a:p>
+        </p:txBody>
+      </p:sp>
+      <p:sp>
+        <p:nvSpPr>
+          <p:cNvPr id="4" name="Symbol zastępczy numeru slajdu 3"/>
+          <p:cNvSpPr>
+            <a:spLocks noGrp="1"/>
+          </p:cNvSpPr>
+          <p:nvPr>
+            <p:ph type="sldNum" sz="quarter" idx="10"/>
+          </p:nvPr>
+        </p:nvSpPr>
+        <p:spPr/>
+        <p:txBody>
+          <a:bodyPr/>
+          <a:lstStyle/>
+          <a:p>
+            <a:fld id="{3E76F650-3CB8-47FC-976C-2A9F6850CF71}" type="slidenum">
+              <a:rPr lang="pl-PL" smtClean="0"/>
+              <a:t>2</a:t>
+            </a:fld>
+            <a:endParaRPr lang="pl-PL"/>
+          </a:p>
+        </p:txBody>
+      </p:sp>
+    </p:spTree>
+    <p:extLst>
+      <p:ext uri="{BB962C8B-B14F-4D97-AF65-F5344CB8AC3E}">
+        <p14:creationId xmlns:p14="http://schemas.microsoft.com/office/powerpoint/2010/main" val="2867808392"/>
+      </p:ext>
+    </p:extLst>
+  </p:cSld>
+  <p:clrMapOvr>
+    <a:masterClrMapping/>
+  </p:clrMapOvr>
+</p:notes>
+</file>
+
+<file path=ppt/notesSlides/notesSlide3.xml><?xml version="1.0" encoding="utf-8"?>
+<p:notes xmlns:a="http://schemas.openxmlformats.org/drawingml/2006/main" xmlns:r="http://schemas.openxmlformats.org/officeDocument/2006/relationships" xmlns:p="http://schemas.openxmlformats.org/presentationml/2006/main">
+  <p:cSld>
+    <p:spTree>
+      <p:nvGrpSpPr>
+        <p:cNvPr id="1" name=""/>
+        <p:cNvGrpSpPr/>
+        <p:nvPr/>
+      </p:nvGrpSpPr>
+      <p:grpSpPr>
+        <a:xfrm>
+          <a:off x="0" y="0"/>
+          <a:ext cx="0" cy="0"/>
+          <a:chOff x="0" y="0"/>
+          <a:chExt cx="0" cy="0"/>
+        </a:xfrm>
+      </p:grpSpPr>
+      <p:sp>
+        <p:nvSpPr>
+          <p:cNvPr id="2" name="Symbol zastępczy obrazu slajdu 1"/>
+          <p:cNvSpPr>
+            <a:spLocks noGrp="1" noRot="1" noChangeAspect="1"/>
+          </p:cNvSpPr>
+          <p:nvPr>
+            <p:ph type="sldImg"/>
+          </p:nvPr>
+        </p:nvSpPr>
+        <p:spPr/>
+      </p:sp>
+      <p:sp>
+        <p:nvSpPr>
+          <p:cNvPr id="3" name="Symbol zastępczy notatek 2"/>
+          <p:cNvSpPr>
+            <a:spLocks noGrp="1"/>
+          </p:cNvSpPr>
+          <p:nvPr>
+            <p:ph type="body" idx="1"/>
+          </p:nvPr>
+        </p:nvSpPr>
+        <p:spPr/>
+        <p:txBody>
+          <a:bodyPr/>
+          <a:lstStyle/>
+          <a:p>
+            <a:r>
+              <a:rPr lang="pl-PL" dirty="0"/>
+              <a:t>Instrukcję warunkową możemy zapisać także w tzw. pełnej formie, określając kilka warunków i poleceń, jakie mają zostać wykonane.</a:t>
+            </a:r>
+          </a:p>
+          <a:p>
+            <a:r>
+              <a:rPr lang="pl-PL" dirty="0"/>
+              <a:t>Np. tworząc algorytm dla kierowcy, który powie mu jak powinien się zachować na skrzyżowaniu ze światłami, powinniśmy określić co kierowca ma zrobić dla trzech różnych kolorów świateł.</a:t>
+            </a:r>
+          </a:p>
+          <a:p>
+            <a:endParaRPr lang="pl-PL" dirty="0"/>
+          </a:p>
+        </p:txBody>
+      </p:sp>
+      <p:sp>
+        <p:nvSpPr>
+          <p:cNvPr id="4" name="Symbol zastępczy numeru slajdu 3"/>
+          <p:cNvSpPr>
+            <a:spLocks noGrp="1"/>
+          </p:cNvSpPr>
+          <p:nvPr>
+            <p:ph type="sldNum" sz="quarter" idx="10"/>
+          </p:nvPr>
+        </p:nvSpPr>
+        <p:spPr/>
+        <p:txBody>
+          <a:bodyPr/>
+          <a:lstStyle/>
+          <a:p>
+            <a:fld id="{3E76F650-3CB8-47FC-976C-2A9F6850CF71}" type="slidenum">
+              <a:rPr lang="pl-PL" smtClean="0"/>
+              <a:t>3</a:t>
+            </a:fld>
+            <a:endParaRPr lang="pl-PL"/>
+          </a:p>
+        </p:txBody>
+      </p:sp>
+    </p:spTree>
+    <p:extLst>
+      <p:ext uri="{BB962C8B-B14F-4D97-AF65-F5344CB8AC3E}">
+        <p14:creationId xmlns:p14="http://schemas.microsoft.com/office/powerpoint/2010/main" val="1540677924"/>
+      </p:ext>
+    </p:extLst>
+  </p:cSld>
+  <p:clrMapOvr>
+    <a:masterClrMapping/>
+  </p:clrMapOvr>
+</p:notes>
+</file>
+
+<file path=ppt/notesSlides/notesSlide4.xml><?xml version="1.0" encoding="utf-8"?>
+<p:notes xmlns:a="http://schemas.openxmlformats.org/drawingml/2006/main" xmlns:r="http://schemas.openxmlformats.org/officeDocument/2006/relationships" xmlns:p="http://schemas.openxmlformats.org/presentationml/2006/main">
+  <p:cSld>
+    <p:spTree>
+      <p:nvGrpSpPr>
+        <p:cNvPr id="1" name=""/>
+        <p:cNvGrpSpPr/>
+        <p:nvPr/>
+      </p:nvGrpSpPr>
+      <p:grpSpPr>
+        <a:xfrm>
+          <a:off x="0" y="0"/>
+          <a:ext cx="0" cy="0"/>
+          <a:chOff x="0" y="0"/>
+          <a:chExt cx="0" cy="0"/>
+        </a:xfrm>
+      </p:grpSpPr>
+      <p:sp>
+        <p:nvSpPr>
+          <p:cNvPr id="2" name="Symbol zastępczy obrazu slajdu 1"/>
+          <p:cNvSpPr>
+            <a:spLocks noGrp="1" noRot="1" noChangeAspect="1"/>
+          </p:cNvSpPr>
+          <p:nvPr>
+            <p:ph type="sldImg"/>
+          </p:nvPr>
+        </p:nvSpPr>
+        <p:spPr/>
+      </p:sp>
+      <p:sp>
+        <p:nvSpPr>
+          <p:cNvPr id="3" name="Symbol zastępczy notatek 2"/>
+          <p:cNvSpPr>
+            <a:spLocks noGrp="1"/>
+          </p:cNvSpPr>
+          <p:nvPr>
+            <p:ph type="body" idx="1"/>
+          </p:nvPr>
+        </p:nvSpPr>
+        <p:spPr/>
+        <p:txBody>
+          <a:bodyPr/>
+          <a:lstStyle/>
+          <a:p>
+            <a:r>
+              <a:rPr lang="pl-PL" dirty="0"/>
+              <a:t>Czasem w algorytmie potrzebujemy powiedzieć, że pewna instrukcja (polecenie) ma zostać wykonane wielokrotnie. Np. słodząc herbatę powinniśmy ją mieszać tak długo, aż cukier się w niej rozpuści.</a:t>
+            </a:r>
+          </a:p>
+          <a:p>
+            <a:r>
+              <a:rPr lang="pl-PL" dirty="0"/>
+              <a:t>W tym celu możemy użyć pętli dopóki. Pętla dopóki mówi nam, że podana instrukcja (lub zestaw instrukcji) ma być wykonywana tak długo, jak długo spełniony jest warunek pętli.</a:t>
+            </a:r>
+          </a:p>
+          <a:p>
+            <a:r>
+              <a:rPr lang="pl-PL" dirty="0"/>
+              <a:t>Pętlę dopóki nazywamy pętlą warunkową.</a:t>
+            </a:r>
+          </a:p>
+        </p:txBody>
+      </p:sp>
+      <p:sp>
+        <p:nvSpPr>
+          <p:cNvPr id="4" name="Symbol zastępczy numeru slajdu 3"/>
+          <p:cNvSpPr>
+            <a:spLocks noGrp="1"/>
+          </p:cNvSpPr>
+          <p:nvPr>
+            <p:ph type="sldNum" sz="quarter" idx="10"/>
+          </p:nvPr>
+        </p:nvSpPr>
+        <p:spPr/>
+        <p:txBody>
+          <a:bodyPr/>
+          <a:lstStyle/>
+          <a:p>
+            <a:fld id="{3E76F650-3CB8-47FC-976C-2A9F6850CF71}" type="slidenum">
+              <a:rPr lang="pl-PL" smtClean="0"/>
+              <a:t>4</a:t>
+            </a:fld>
+            <a:endParaRPr lang="pl-PL"/>
+          </a:p>
+        </p:txBody>
+      </p:sp>
+    </p:spTree>
+    <p:extLst>
+      <p:ext uri="{BB962C8B-B14F-4D97-AF65-F5344CB8AC3E}">
+        <p14:creationId xmlns:p14="http://schemas.microsoft.com/office/powerpoint/2010/main" val="3006340127"/>
+      </p:ext>
+    </p:extLst>
+  </p:cSld>
+  <p:clrMapOvr>
+    <a:masterClrMapping/>
+  </p:clrMapOvr>
+</p:notes>
+</file>
+
+<file path=ppt/notesSlides/notesSlide5.xml><?xml version="1.0" encoding="utf-8"?>
+<p:notes xmlns:a="http://schemas.openxmlformats.org/drawingml/2006/main" xmlns:r="http://schemas.openxmlformats.org/officeDocument/2006/relationships" xmlns:p="http://schemas.openxmlformats.org/presentationml/2006/main">
+  <p:cSld>
+    <p:spTree>
+      <p:nvGrpSpPr>
+        <p:cNvPr id="1" name=""/>
+        <p:cNvGrpSpPr/>
+        <p:nvPr/>
+      </p:nvGrpSpPr>
+      <p:grpSpPr>
+        <a:xfrm>
+          <a:off x="0" y="0"/>
+          <a:ext cx="0" cy="0"/>
+          <a:chOff x="0" y="0"/>
+          <a:chExt cx="0" cy="0"/>
+        </a:xfrm>
+      </p:grpSpPr>
+      <p:sp>
+        <p:nvSpPr>
+          <p:cNvPr id="2" name="Symbol zastępczy obrazu slajdu 1"/>
+          <p:cNvSpPr>
+            <a:spLocks noGrp="1" noRot="1" noChangeAspect="1"/>
+          </p:cNvSpPr>
+          <p:nvPr>
+            <p:ph type="sldImg"/>
+          </p:nvPr>
+        </p:nvSpPr>
+        <p:spPr/>
+      </p:sp>
+      <p:sp>
+        <p:nvSpPr>
+          <p:cNvPr id="3" name="Symbol zastępczy notatek 2"/>
+          <p:cNvSpPr>
+            <a:spLocks noGrp="1"/>
+          </p:cNvSpPr>
+          <p:nvPr>
+            <p:ph type="body" idx="1"/>
+          </p:nvPr>
+        </p:nvSpPr>
+        <p:spPr/>
+        <p:txBody>
+          <a:bodyPr/>
+          <a:lstStyle/>
+          <a:p>
+            <a:r>
+              <a:rPr lang="pl-PL" dirty="0"/>
+              <a:t>Pętle możemy zagnieżdżać, czyli umieszczać jedną w drugiej.</a:t>
+            </a:r>
+          </a:p>
+        </p:txBody>
+      </p:sp>
+      <p:sp>
+        <p:nvSpPr>
+          <p:cNvPr id="4" name="Symbol zastępczy numeru slajdu 3"/>
+          <p:cNvSpPr>
+            <a:spLocks noGrp="1"/>
+          </p:cNvSpPr>
+          <p:nvPr>
+            <p:ph type="sldNum" sz="quarter" idx="10"/>
+          </p:nvPr>
+        </p:nvSpPr>
+        <p:spPr/>
+        <p:txBody>
+          <a:bodyPr/>
+          <a:lstStyle/>
+          <a:p>
+            <a:fld id="{3E76F650-3CB8-47FC-976C-2A9F6850CF71}" type="slidenum">
+              <a:rPr lang="pl-PL" smtClean="0"/>
+              <a:t>5</a:t>
+            </a:fld>
+            <a:endParaRPr lang="pl-PL"/>
+          </a:p>
+        </p:txBody>
+      </p:sp>
+    </p:spTree>
+    <p:extLst>
+      <p:ext uri="{BB962C8B-B14F-4D97-AF65-F5344CB8AC3E}">
+        <p14:creationId xmlns:p14="http://schemas.microsoft.com/office/powerpoint/2010/main" val="324716842"/>
+      </p:ext>
+    </p:extLst>
+  </p:cSld>
+  <p:clrMapOvr>
+    <a:masterClrMapping/>
+  </p:clrMapOvr>
+</p:notes>
+</file>
+
+<file path=ppt/notesSlides/notesSlide6.xml><?xml version="1.0" encoding="utf-8"?>
+<p:notes xmlns:a="http://schemas.openxmlformats.org/drawingml/2006/main" xmlns:r="http://schemas.openxmlformats.org/officeDocument/2006/relationships" xmlns:p="http://schemas.openxmlformats.org/presentationml/2006/main">
+  <p:cSld>
+    <p:spTree>
+      <p:nvGrpSpPr>
+        <p:cNvPr id="1" name=""/>
+        <p:cNvGrpSpPr/>
+        <p:nvPr/>
+      </p:nvGrpSpPr>
+      <p:grpSpPr>
+        <a:xfrm>
+          <a:off x="0" y="0"/>
+          <a:ext cx="0" cy="0"/>
+          <a:chOff x="0" y="0"/>
+          <a:chExt cx="0" cy="0"/>
+        </a:xfrm>
+      </p:grpSpPr>
+      <p:sp>
+        <p:nvSpPr>
+          <p:cNvPr id="2" name="Symbol zastępczy obrazu slajdu 1"/>
+          <p:cNvSpPr>
+            <a:spLocks noGrp="1" noRot="1" noChangeAspect="1"/>
+          </p:cNvSpPr>
+          <p:nvPr>
+            <p:ph type="sldImg"/>
+          </p:nvPr>
+        </p:nvSpPr>
+        <p:spPr/>
+      </p:sp>
+      <p:sp>
+        <p:nvSpPr>
+          <p:cNvPr id="3" name="Symbol zastępczy notatek 2"/>
+          <p:cNvSpPr>
+            <a:spLocks noGrp="1"/>
+          </p:cNvSpPr>
+          <p:nvPr>
+            <p:ph type="body" idx="1"/>
+          </p:nvPr>
+        </p:nvSpPr>
+        <p:spPr/>
+        <p:txBody>
+          <a:bodyPr/>
+          <a:lstStyle/>
+          <a:p>
+            <a:r>
+              <a:rPr lang="pl-PL" dirty="0"/>
+              <a:t>Poza pętlami warunkowymi mamy także tzw. pętle liczone. Taka pętla pozwala nam powiedzieć, że coś ma zostać wykonane określoną liczbę razy.</a:t>
+            </a:r>
+          </a:p>
+        </p:txBody>
+      </p:sp>
+      <p:sp>
+        <p:nvSpPr>
+          <p:cNvPr id="4" name="Symbol zastępczy numeru slajdu 3"/>
+          <p:cNvSpPr>
+            <a:spLocks noGrp="1"/>
+          </p:cNvSpPr>
+          <p:nvPr>
+            <p:ph type="sldNum" sz="quarter" idx="10"/>
+          </p:nvPr>
+        </p:nvSpPr>
+        <p:spPr/>
+        <p:txBody>
+          <a:bodyPr/>
+          <a:lstStyle/>
+          <a:p>
+            <a:fld id="{3E76F650-3CB8-47FC-976C-2A9F6850CF71}" type="slidenum">
+              <a:rPr lang="pl-PL" smtClean="0"/>
+              <a:t>6</a:t>
+            </a:fld>
+            <a:endParaRPr lang="pl-PL"/>
+          </a:p>
+        </p:txBody>
+      </p:sp>
+    </p:spTree>
+    <p:extLst>
+      <p:ext uri="{BB962C8B-B14F-4D97-AF65-F5344CB8AC3E}">
+        <p14:creationId xmlns:p14="http://schemas.microsoft.com/office/powerpoint/2010/main" val="1295341501"/>
+      </p:ext>
+    </p:extLst>
+  </p:cSld>
+  <p:clrMapOvr>
+    <a:masterClrMapping/>
+  </p:clrMapOvr>
+</p:notes>
+</file>
+
 <file path=ppt/slideLayouts/slideLayout1.xml><?xml version="1.0" encoding="utf-8"?>
 <p:sldLayout xmlns:a="http://schemas.openxmlformats.org/drawingml/2006/main" xmlns:r="http://schemas.openxmlformats.org/officeDocument/2006/relationships" xmlns:p="http://schemas.openxmlformats.org/presentationml/2006/main" type="title" preserve="1">
   <p:cSld name="Slajd tytułowy">
@@ -658,7 +1252,7 @@
             <a:fld id="{66221E02-25CB-4963-84BC-0813985E7D90}" type="datetimeFigureOut">
               <a:rPr lang="pl-PL" smtClean="0"/>
               <a:pPr/>
-              <a:t>30.05.2018</a:t>
+              <a:t>21.06.2018</a:t>
             </a:fld>
             <a:endParaRPr lang="pl-PL"/>
           </a:p>
@@ -823,7 +1417,7 @@
             <a:fld id="{66221E02-25CB-4963-84BC-0813985E7D90}" type="datetimeFigureOut">
               <a:rPr lang="pl-PL" smtClean="0"/>
               <a:pPr/>
-              <a:t>30.05.2018</a:t>
+              <a:t>21.06.2018</a:t>
             </a:fld>
             <a:endParaRPr lang="pl-PL"/>
           </a:p>
@@ -998,7 +1592,7 @@
             <a:fld id="{66221E02-25CB-4963-84BC-0813985E7D90}" type="datetimeFigureOut">
               <a:rPr lang="pl-PL" smtClean="0"/>
               <a:pPr/>
-              <a:t>30.05.2018</a:t>
+              <a:t>21.06.2018</a:t>
             </a:fld>
             <a:endParaRPr lang="pl-PL"/>
           </a:p>
@@ -1163,7 +1757,7 @@
             <a:fld id="{66221E02-25CB-4963-84BC-0813985E7D90}" type="datetimeFigureOut">
               <a:rPr lang="pl-PL" smtClean="0"/>
               <a:pPr/>
-              <a:t>30.05.2018</a:t>
+              <a:t>21.06.2018</a:t>
             </a:fld>
             <a:endParaRPr lang="pl-PL"/>
           </a:p>
@@ -1405,7 +1999,7 @@
             <a:fld id="{66221E02-25CB-4963-84BC-0813985E7D90}" type="datetimeFigureOut">
               <a:rPr lang="pl-PL" smtClean="0"/>
               <a:pPr/>
-              <a:t>30.05.2018</a:t>
+              <a:t>21.06.2018</a:t>
             </a:fld>
             <a:endParaRPr lang="pl-PL"/>
           </a:p>
@@ -1687,7 +2281,7 @@
             <a:fld id="{66221E02-25CB-4963-84BC-0813985E7D90}" type="datetimeFigureOut">
               <a:rPr lang="pl-PL" smtClean="0"/>
               <a:pPr/>
-              <a:t>30.05.2018</a:t>
+              <a:t>21.06.2018</a:t>
             </a:fld>
             <a:endParaRPr lang="pl-PL"/>
           </a:p>
@@ -2103,7 +2697,7 @@
             <a:fld id="{66221E02-25CB-4963-84BC-0813985E7D90}" type="datetimeFigureOut">
               <a:rPr lang="pl-PL" smtClean="0"/>
               <a:pPr/>
-              <a:t>30.05.2018</a:t>
+              <a:t>21.06.2018</a:t>
             </a:fld>
             <a:endParaRPr lang="pl-PL"/>
           </a:p>
@@ -2217,7 +2811,7 @@
             <a:fld id="{66221E02-25CB-4963-84BC-0813985E7D90}" type="datetimeFigureOut">
               <a:rPr lang="pl-PL" smtClean="0"/>
               <a:pPr/>
-              <a:t>30.05.2018</a:t>
+              <a:t>21.06.2018</a:t>
             </a:fld>
             <a:endParaRPr lang="pl-PL"/>
           </a:p>
@@ -2309,7 +2903,7 @@
             <a:fld id="{66221E02-25CB-4963-84BC-0813985E7D90}" type="datetimeFigureOut">
               <a:rPr lang="pl-PL" smtClean="0"/>
               <a:pPr/>
-              <a:t>30.05.2018</a:t>
+              <a:t>21.06.2018</a:t>
             </a:fld>
             <a:endParaRPr lang="pl-PL"/>
           </a:p>
@@ -2581,7 +3175,7 @@
             <a:fld id="{66221E02-25CB-4963-84BC-0813985E7D90}" type="datetimeFigureOut">
               <a:rPr lang="pl-PL" smtClean="0"/>
               <a:pPr/>
-              <a:t>30.05.2018</a:t>
+              <a:t>21.06.2018</a:t>
             </a:fld>
             <a:endParaRPr lang="pl-PL"/>
           </a:p>
@@ -2830,7 +3424,7 @@
             <a:fld id="{66221E02-25CB-4963-84BC-0813985E7D90}" type="datetimeFigureOut">
               <a:rPr lang="pl-PL" smtClean="0"/>
               <a:pPr/>
-              <a:t>30.05.2018</a:t>
+              <a:t>21.06.2018</a:t>
             </a:fld>
             <a:endParaRPr lang="pl-PL"/>
           </a:p>
@@ -3038,7 +3632,7 @@
             <a:fld id="{66221E02-25CB-4963-84BC-0813985E7D90}" type="datetimeFigureOut">
               <a:rPr lang="pl-PL" smtClean="0"/>
               <a:pPr/>
-              <a:t>30.05.2018</a:t>
+              <a:t>21.06.2018</a:t>
             </a:fld>
             <a:endParaRPr lang="pl-PL"/>
           </a:p>
@@ -3741,11 +4335,11 @@
           <p:nvPr/>
         </p:nvPicPr>
         <p:blipFill>
-          <a:blip r:embed="rId2">
+          <a:blip r:embed="rId3">
             <a:extLst>
               <a:ext uri="{BEBA8EAE-BF5A-486C-A8C5-ECC9F3942E4B}">
                 <a14:imgProps xmlns:a14="http://schemas.microsoft.com/office/drawing/2010/main">
-                  <a14:imgLayer r:embed="rId3">
+                  <a14:imgLayer r:embed="rId4">
                     <a14:imgEffect>
                       <a14:backgroundRemoval t="9220" b="92199" l="2286" r="93143">
                         <a14:foregroundMark x1="6000" y1="65248" x2="6000" y2="65248"/>
@@ -3762,7 +4356,7 @@
                 <a14:useLocalDpi xmlns:a14="http://schemas.microsoft.com/office/drawing/2010/main" val="0"/>
               </a:ext>
               <a:ext uri="{837473B0-CC2E-450A-ABE3-18F120FF3D39}">
-                <a1611:picAttrSrcUrl xmlns:a1611="http://schemas.microsoft.com/office/drawing/2016/11/main" r:id="rId4"/>
+                <a1611:picAttrSrcUrl xmlns:a1611="http://schemas.microsoft.com/office/drawing/2016/11/main" r:id="rId5"/>
               </a:ext>
             </a:extLst>
           </a:blip>
@@ -3843,7 +4437,7 @@
           <p:nvPr/>
         </p:nvPicPr>
         <p:blipFill rotWithShape="1">
-          <a:blip r:embed="rId2">
+          <a:blip r:embed="rId3">
             <a:extLst>
               <a:ext uri="{28A0092B-C50C-407E-A947-70E740481C1C}">
                 <a14:useLocalDpi xmlns:a14="http://schemas.microsoft.com/office/drawing/2010/main" val="0"/>
@@ -4151,13 +4745,13 @@
           <p:nvPr/>
         </p:nvPicPr>
         <p:blipFill rotWithShape="1">
-          <a:blip r:embed="rId2">
+          <a:blip r:embed="rId3">
             <a:extLst>
               <a:ext uri="{28A0092B-C50C-407E-A947-70E740481C1C}">
                 <a14:useLocalDpi xmlns:a14="http://schemas.microsoft.com/office/drawing/2010/main" val="0"/>
               </a:ext>
               <a:ext uri="{837473B0-CC2E-450A-ABE3-18F120FF3D39}">
-                <a1611:picAttrSrcUrl xmlns:a1611="http://schemas.microsoft.com/office/drawing/2016/11/main" r:id="rId3"/>
+                <a1611:picAttrSrcUrl xmlns:a1611="http://schemas.microsoft.com/office/drawing/2016/11/main" r:id="rId4"/>
               </a:ext>
             </a:extLst>
           </a:blip>
@@ -4521,7 +5115,7 @@
           <p:nvPr/>
         </p:nvPicPr>
         <p:blipFill rotWithShape="1">
-          <a:blip r:embed="rId2">
+          <a:blip r:embed="rId3">
             <a:extLst>
               <a:ext uri="{28A0092B-C50C-407E-A947-70E740481C1C}">
                 <a14:useLocalDpi xmlns:a14="http://schemas.microsoft.com/office/drawing/2010/main" val="0"/>
@@ -4760,7 +5354,7 @@
           <p:nvPr/>
         </p:nvPicPr>
         <p:blipFill rotWithShape="1">
-          <a:blip r:embed="rId2">
+          <a:blip r:embed="rId3">
             <a:extLst>
               <a:ext uri="{28A0092B-C50C-407E-A947-70E740481C1C}">
                 <a14:useLocalDpi xmlns:a14="http://schemas.microsoft.com/office/drawing/2010/main" val="0"/>

</xml_diff>

<commit_message>
Dodano nowe slajdy do prezentacji z algorytmow
</commit_message>
<xml_diff>
--- a/Wprowadzenie do algorytmów/I. Wprowadzenie do algorytmów/Algorytmy.pptx
+++ b/Wprowadzenie do algorytmów/I. Wprowadzenie do algorytmów/Algorytmy.pptx
@@ -5,16 +5,19 @@
     <p:sldMasterId id="2147483648" r:id="rId1"/>
   </p:sldMasterIdLst>
   <p:notesMasterIdLst>
-    <p:notesMasterId r:id="rId9"/>
+    <p:notesMasterId r:id="rId12"/>
   </p:notesMasterIdLst>
   <p:sldIdLst>
     <p:sldId id="264" r:id="rId2"/>
     <p:sldId id="265" r:id="rId3"/>
     <p:sldId id="269" r:id="rId4"/>
-    <p:sldId id="266" r:id="rId5"/>
-    <p:sldId id="267" r:id="rId6"/>
-    <p:sldId id="268" r:id="rId7"/>
-    <p:sldId id="263" r:id="rId8"/>
+    <p:sldId id="270" r:id="rId5"/>
+    <p:sldId id="271" r:id="rId6"/>
+    <p:sldId id="272" r:id="rId7"/>
+    <p:sldId id="266" r:id="rId8"/>
+    <p:sldId id="267" r:id="rId9"/>
+    <p:sldId id="268" r:id="rId10"/>
+    <p:sldId id="263" r:id="rId11"/>
   </p:sldIdLst>
   <p:sldSz cx="9144000" cy="6858000" type="screen4x3"/>
   <p:notesSz cx="6858000" cy="9144000"/>
@@ -214,7 +217,7 @@
           <a:p>
             <a:fld id="{FE99C238-BBD4-47FA-ADDF-FFB895C0A193}" type="datetimeFigureOut">
               <a:rPr lang="pl-PL" smtClean="0"/>
-              <a:t>21.06.2018</a:t>
+              <a:t>08.01.2019</a:t>
             </a:fld>
             <a:endParaRPr lang="pl-PL"/>
           </a:p>
@@ -845,20 +848,17 @@
           <a:p>
             <a:r>
               <a:rPr lang="pl-PL" dirty="0"/>
-              <a:t>Czasem w algorytmie potrzebujemy powiedzieć, że pewna instrukcja (polecenie) ma zostać wykonane wielokrotnie. Np. słodząc herbatę powinniśmy ją mieszać tak długo, aż cukier się w niej rozpuści.</a:t>
+              <a:t>Instrukcję warunkową możemy zapisać także w tzw. pełnej formie, określając kilka warunków i poleceń, jakie mają zostać wykonane.</a:t>
             </a:r>
           </a:p>
           <a:p>
             <a:r>
               <a:rPr lang="pl-PL" dirty="0"/>
-              <a:t>W tym celu możemy użyć pętli dopóki. Pętla dopóki mówi nam, że podana instrukcja (lub zestaw instrukcji) ma być wykonywana tak długo, jak długo spełniony jest warunek pętli.</a:t>
-            </a:r>
-          </a:p>
-          <a:p>
-            <a:r>
-              <a:rPr lang="pl-PL" dirty="0"/>
-              <a:t>Pętlę dopóki nazywamy pętlą warunkową.</a:t>
-            </a:r>
+              <a:t>Np. tworząc algorytm dla kierowcy, który powie mu jak powinien się zachować na skrzyżowaniu ze światłami, powinniśmy określić co kierowca ma zrobić dla trzech różnych kolorów świateł.</a:t>
+            </a:r>
+          </a:p>
+          <a:p>
+            <a:endParaRPr lang="pl-PL" dirty="0"/>
           </a:p>
         </p:txBody>
       </p:sp>
@@ -888,7 +888,7 @@
     </p:spTree>
     <p:extLst>
       <p:ext uri="{BB962C8B-B14F-4D97-AF65-F5344CB8AC3E}">
-        <p14:creationId xmlns:p14="http://schemas.microsoft.com/office/powerpoint/2010/main" val="3006340127"/>
+        <p14:creationId xmlns:p14="http://schemas.microsoft.com/office/powerpoint/2010/main" val="2764042477"/>
       </p:ext>
     </p:extLst>
   </p:cSld>
@@ -944,8 +944,17 @@
           <a:p>
             <a:r>
               <a:rPr lang="pl-PL" dirty="0"/>
-              <a:t>Pętle możemy zagnieżdżać, czyli umieszczać jedną w drugiej.</a:t>
-            </a:r>
+              <a:t>Instrukcję warunkową możemy zapisać także w tzw. pełnej formie, określając kilka warunków i poleceń, jakie mają zostać wykonane.</a:t>
+            </a:r>
+          </a:p>
+          <a:p>
+            <a:r>
+              <a:rPr lang="pl-PL" dirty="0"/>
+              <a:t>Np. tworząc algorytm dla kierowcy, który powie mu jak powinien się zachować na skrzyżowaniu ze światłami, powinniśmy określić co kierowca ma zrobić dla trzech różnych kolorów świateł.</a:t>
+            </a:r>
+          </a:p>
+          <a:p>
+            <a:endParaRPr lang="pl-PL" dirty="0"/>
           </a:p>
         </p:txBody>
       </p:sp>
@@ -975,7 +984,7 @@
     </p:spTree>
     <p:extLst>
       <p:ext uri="{BB962C8B-B14F-4D97-AF65-F5344CB8AC3E}">
-        <p14:creationId xmlns:p14="http://schemas.microsoft.com/office/powerpoint/2010/main" val="324716842"/>
+        <p14:creationId xmlns:p14="http://schemas.microsoft.com/office/powerpoint/2010/main" val="2938243347"/>
       </p:ext>
     </p:extLst>
   </p:cSld>
@@ -1031,8 +1040,17 @@
           <a:p>
             <a:r>
               <a:rPr lang="pl-PL" dirty="0"/>
-              <a:t>Poza pętlami warunkowymi mamy także tzw. pętle liczone. Taka pętla pozwala nam powiedzieć, że coś ma zostać wykonane określoną liczbę razy.</a:t>
-            </a:r>
+              <a:t>Instrukcję warunkową możemy zapisać także w tzw. pełnej formie, określając kilka warunków i poleceń, jakie mają zostać wykonane.</a:t>
+            </a:r>
+          </a:p>
+          <a:p>
+            <a:r>
+              <a:rPr lang="pl-PL" dirty="0"/>
+              <a:t>Np. tworząc algorytm dla kierowcy, który powie mu jak powinien się zachować na skrzyżowaniu ze światłami, powinniśmy określić co kierowca ma zrobić dla trzech różnych kolorów świateł.</a:t>
+            </a:r>
+          </a:p>
+          <a:p>
+            <a:endParaRPr lang="pl-PL" dirty="0"/>
           </a:p>
         </p:txBody>
       </p:sp>
@@ -1054,6 +1072,279 @@
             <a:fld id="{3E76F650-3CB8-47FC-976C-2A9F6850CF71}" type="slidenum">
               <a:rPr lang="pl-PL" smtClean="0"/>
               <a:t>6</a:t>
+            </a:fld>
+            <a:endParaRPr lang="pl-PL"/>
+          </a:p>
+        </p:txBody>
+      </p:sp>
+    </p:spTree>
+    <p:extLst>
+      <p:ext uri="{BB962C8B-B14F-4D97-AF65-F5344CB8AC3E}">
+        <p14:creationId xmlns:p14="http://schemas.microsoft.com/office/powerpoint/2010/main" val="3503894592"/>
+      </p:ext>
+    </p:extLst>
+  </p:cSld>
+  <p:clrMapOvr>
+    <a:masterClrMapping/>
+  </p:clrMapOvr>
+</p:notes>
+</file>
+
+<file path=ppt/notesSlides/notesSlide7.xml><?xml version="1.0" encoding="utf-8"?>
+<p:notes xmlns:a="http://schemas.openxmlformats.org/drawingml/2006/main" xmlns:r="http://schemas.openxmlformats.org/officeDocument/2006/relationships" xmlns:p="http://schemas.openxmlformats.org/presentationml/2006/main">
+  <p:cSld>
+    <p:spTree>
+      <p:nvGrpSpPr>
+        <p:cNvPr id="1" name=""/>
+        <p:cNvGrpSpPr/>
+        <p:nvPr/>
+      </p:nvGrpSpPr>
+      <p:grpSpPr>
+        <a:xfrm>
+          <a:off x="0" y="0"/>
+          <a:ext cx="0" cy="0"/>
+          <a:chOff x="0" y="0"/>
+          <a:chExt cx="0" cy="0"/>
+        </a:xfrm>
+      </p:grpSpPr>
+      <p:sp>
+        <p:nvSpPr>
+          <p:cNvPr id="2" name="Symbol zastępczy obrazu slajdu 1"/>
+          <p:cNvSpPr>
+            <a:spLocks noGrp="1" noRot="1" noChangeAspect="1"/>
+          </p:cNvSpPr>
+          <p:nvPr>
+            <p:ph type="sldImg"/>
+          </p:nvPr>
+        </p:nvSpPr>
+        <p:spPr/>
+      </p:sp>
+      <p:sp>
+        <p:nvSpPr>
+          <p:cNvPr id="3" name="Symbol zastępczy notatek 2"/>
+          <p:cNvSpPr>
+            <a:spLocks noGrp="1"/>
+          </p:cNvSpPr>
+          <p:nvPr>
+            <p:ph type="body" idx="1"/>
+          </p:nvPr>
+        </p:nvSpPr>
+        <p:spPr/>
+        <p:txBody>
+          <a:bodyPr/>
+          <a:lstStyle/>
+          <a:p>
+            <a:r>
+              <a:rPr lang="pl-PL" dirty="0"/>
+              <a:t>Czasem w algorytmie potrzebujemy powiedzieć, że pewna instrukcja (polecenie) ma zostać wykonane wielokrotnie. Np. słodząc herbatę powinniśmy ją mieszać tak długo, aż cukier się w niej rozpuści.</a:t>
+            </a:r>
+          </a:p>
+          <a:p>
+            <a:r>
+              <a:rPr lang="pl-PL" dirty="0"/>
+              <a:t>W tym celu możemy użyć pętli dopóki. Pętla dopóki mówi nam, że podana instrukcja (lub zestaw instrukcji) ma być wykonywana tak długo, jak długo spełniony jest warunek pętli.</a:t>
+            </a:r>
+          </a:p>
+          <a:p>
+            <a:r>
+              <a:rPr lang="pl-PL" dirty="0"/>
+              <a:t>Pętlę dopóki nazywamy pętlą warunkową.</a:t>
+            </a:r>
+          </a:p>
+        </p:txBody>
+      </p:sp>
+      <p:sp>
+        <p:nvSpPr>
+          <p:cNvPr id="4" name="Symbol zastępczy numeru slajdu 3"/>
+          <p:cNvSpPr>
+            <a:spLocks noGrp="1"/>
+          </p:cNvSpPr>
+          <p:nvPr>
+            <p:ph type="sldNum" sz="quarter" idx="10"/>
+          </p:nvPr>
+        </p:nvSpPr>
+        <p:spPr/>
+        <p:txBody>
+          <a:bodyPr/>
+          <a:lstStyle/>
+          <a:p>
+            <a:fld id="{3E76F650-3CB8-47FC-976C-2A9F6850CF71}" type="slidenum">
+              <a:rPr lang="pl-PL" smtClean="0"/>
+              <a:t>7</a:t>
+            </a:fld>
+            <a:endParaRPr lang="pl-PL"/>
+          </a:p>
+        </p:txBody>
+      </p:sp>
+    </p:spTree>
+    <p:extLst>
+      <p:ext uri="{BB962C8B-B14F-4D97-AF65-F5344CB8AC3E}">
+        <p14:creationId xmlns:p14="http://schemas.microsoft.com/office/powerpoint/2010/main" val="3006340127"/>
+      </p:ext>
+    </p:extLst>
+  </p:cSld>
+  <p:clrMapOvr>
+    <a:masterClrMapping/>
+  </p:clrMapOvr>
+</p:notes>
+</file>
+
+<file path=ppt/notesSlides/notesSlide8.xml><?xml version="1.0" encoding="utf-8"?>
+<p:notes xmlns:a="http://schemas.openxmlformats.org/drawingml/2006/main" xmlns:r="http://schemas.openxmlformats.org/officeDocument/2006/relationships" xmlns:p="http://schemas.openxmlformats.org/presentationml/2006/main">
+  <p:cSld>
+    <p:spTree>
+      <p:nvGrpSpPr>
+        <p:cNvPr id="1" name=""/>
+        <p:cNvGrpSpPr/>
+        <p:nvPr/>
+      </p:nvGrpSpPr>
+      <p:grpSpPr>
+        <a:xfrm>
+          <a:off x="0" y="0"/>
+          <a:ext cx="0" cy="0"/>
+          <a:chOff x="0" y="0"/>
+          <a:chExt cx="0" cy="0"/>
+        </a:xfrm>
+      </p:grpSpPr>
+      <p:sp>
+        <p:nvSpPr>
+          <p:cNvPr id="2" name="Symbol zastępczy obrazu slajdu 1"/>
+          <p:cNvSpPr>
+            <a:spLocks noGrp="1" noRot="1" noChangeAspect="1"/>
+          </p:cNvSpPr>
+          <p:nvPr>
+            <p:ph type="sldImg"/>
+          </p:nvPr>
+        </p:nvSpPr>
+        <p:spPr/>
+      </p:sp>
+      <p:sp>
+        <p:nvSpPr>
+          <p:cNvPr id="3" name="Symbol zastępczy notatek 2"/>
+          <p:cNvSpPr>
+            <a:spLocks noGrp="1"/>
+          </p:cNvSpPr>
+          <p:nvPr>
+            <p:ph type="body" idx="1"/>
+          </p:nvPr>
+        </p:nvSpPr>
+        <p:spPr/>
+        <p:txBody>
+          <a:bodyPr/>
+          <a:lstStyle/>
+          <a:p>
+            <a:r>
+              <a:rPr lang="pl-PL" dirty="0"/>
+              <a:t>Pętle możemy zagnieżdżać, czyli umieszczać jedną w drugiej.</a:t>
+            </a:r>
+          </a:p>
+        </p:txBody>
+      </p:sp>
+      <p:sp>
+        <p:nvSpPr>
+          <p:cNvPr id="4" name="Symbol zastępczy numeru slajdu 3"/>
+          <p:cNvSpPr>
+            <a:spLocks noGrp="1"/>
+          </p:cNvSpPr>
+          <p:nvPr>
+            <p:ph type="sldNum" sz="quarter" idx="10"/>
+          </p:nvPr>
+        </p:nvSpPr>
+        <p:spPr/>
+        <p:txBody>
+          <a:bodyPr/>
+          <a:lstStyle/>
+          <a:p>
+            <a:fld id="{3E76F650-3CB8-47FC-976C-2A9F6850CF71}" type="slidenum">
+              <a:rPr lang="pl-PL" smtClean="0"/>
+              <a:t>8</a:t>
+            </a:fld>
+            <a:endParaRPr lang="pl-PL"/>
+          </a:p>
+        </p:txBody>
+      </p:sp>
+    </p:spTree>
+    <p:extLst>
+      <p:ext uri="{BB962C8B-B14F-4D97-AF65-F5344CB8AC3E}">
+        <p14:creationId xmlns:p14="http://schemas.microsoft.com/office/powerpoint/2010/main" val="324716842"/>
+      </p:ext>
+    </p:extLst>
+  </p:cSld>
+  <p:clrMapOvr>
+    <a:masterClrMapping/>
+  </p:clrMapOvr>
+</p:notes>
+</file>
+
+<file path=ppt/notesSlides/notesSlide9.xml><?xml version="1.0" encoding="utf-8"?>
+<p:notes xmlns:a="http://schemas.openxmlformats.org/drawingml/2006/main" xmlns:r="http://schemas.openxmlformats.org/officeDocument/2006/relationships" xmlns:p="http://schemas.openxmlformats.org/presentationml/2006/main">
+  <p:cSld>
+    <p:spTree>
+      <p:nvGrpSpPr>
+        <p:cNvPr id="1" name=""/>
+        <p:cNvGrpSpPr/>
+        <p:nvPr/>
+      </p:nvGrpSpPr>
+      <p:grpSpPr>
+        <a:xfrm>
+          <a:off x="0" y="0"/>
+          <a:ext cx="0" cy="0"/>
+          <a:chOff x="0" y="0"/>
+          <a:chExt cx="0" cy="0"/>
+        </a:xfrm>
+      </p:grpSpPr>
+      <p:sp>
+        <p:nvSpPr>
+          <p:cNvPr id="2" name="Symbol zastępczy obrazu slajdu 1"/>
+          <p:cNvSpPr>
+            <a:spLocks noGrp="1" noRot="1" noChangeAspect="1"/>
+          </p:cNvSpPr>
+          <p:nvPr>
+            <p:ph type="sldImg"/>
+          </p:nvPr>
+        </p:nvSpPr>
+        <p:spPr/>
+      </p:sp>
+      <p:sp>
+        <p:nvSpPr>
+          <p:cNvPr id="3" name="Symbol zastępczy notatek 2"/>
+          <p:cNvSpPr>
+            <a:spLocks noGrp="1"/>
+          </p:cNvSpPr>
+          <p:nvPr>
+            <p:ph type="body" idx="1"/>
+          </p:nvPr>
+        </p:nvSpPr>
+        <p:spPr/>
+        <p:txBody>
+          <a:bodyPr/>
+          <a:lstStyle/>
+          <a:p>
+            <a:r>
+              <a:rPr lang="pl-PL" dirty="0"/>
+              <a:t>Poza pętlami warunkowymi mamy także tzw. pętle liczone. Taka pętla pozwala nam powiedzieć, że coś ma zostać wykonane określoną liczbę razy.</a:t>
+            </a:r>
+          </a:p>
+        </p:txBody>
+      </p:sp>
+      <p:sp>
+        <p:nvSpPr>
+          <p:cNvPr id="4" name="Symbol zastępczy numeru slajdu 3"/>
+          <p:cNvSpPr>
+            <a:spLocks noGrp="1"/>
+          </p:cNvSpPr>
+          <p:nvPr>
+            <p:ph type="sldNum" sz="quarter" idx="10"/>
+          </p:nvPr>
+        </p:nvSpPr>
+        <p:spPr/>
+        <p:txBody>
+          <a:bodyPr/>
+          <a:lstStyle/>
+          <a:p>
+            <a:fld id="{3E76F650-3CB8-47FC-976C-2A9F6850CF71}" type="slidenum">
+              <a:rPr lang="pl-PL" smtClean="0"/>
+              <a:t>9</a:t>
             </a:fld>
             <a:endParaRPr lang="pl-PL"/>
           </a:p>
@@ -1252,7 +1543,7 @@
             <a:fld id="{66221E02-25CB-4963-84BC-0813985E7D90}" type="datetimeFigureOut">
               <a:rPr lang="pl-PL" smtClean="0"/>
               <a:pPr/>
-              <a:t>21.06.2018</a:t>
+              <a:t>08.01.2019</a:t>
             </a:fld>
             <a:endParaRPr lang="pl-PL"/>
           </a:p>
@@ -1417,7 +1708,7 @@
             <a:fld id="{66221E02-25CB-4963-84BC-0813985E7D90}" type="datetimeFigureOut">
               <a:rPr lang="pl-PL" smtClean="0"/>
               <a:pPr/>
-              <a:t>21.06.2018</a:t>
+              <a:t>08.01.2019</a:t>
             </a:fld>
             <a:endParaRPr lang="pl-PL"/>
           </a:p>
@@ -1592,7 +1883,7 @@
             <a:fld id="{66221E02-25CB-4963-84BC-0813985E7D90}" type="datetimeFigureOut">
               <a:rPr lang="pl-PL" smtClean="0"/>
               <a:pPr/>
-              <a:t>21.06.2018</a:t>
+              <a:t>08.01.2019</a:t>
             </a:fld>
             <a:endParaRPr lang="pl-PL"/>
           </a:p>
@@ -1757,7 +2048,7 @@
             <a:fld id="{66221E02-25CB-4963-84BC-0813985E7D90}" type="datetimeFigureOut">
               <a:rPr lang="pl-PL" smtClean="0"/>
               <a:pPr/>
-              <a:t>21.06.2018</a:t>
+              <a:t>08.01.2019</a:t>
             </a:fld>
             <a:endParaRPr lang="pl-PL"/>
           </a:p>
@@ -1999,7 +2290,7 @@
             <a:fld id="{66221E02-25CB-4963-84BC-0813985E7D90}" type="datetimeFigureOut">
               <a:rPr lang="pl-PL" smtClean="0"/>
               <a:pPr/>
-              <a:t>21.06.2018</a:t>
+              <a:t>08.01.2019</a:t>
             </a:fld>
             <a:endParaRPr lang="pl-PL"/>
           </a:p>
@@ -2281,7 +2572,7 @@
             <a:fld id="{66221E02-25CB-4963-84BC-0813985E7D90}" type="datetimeFigureOut">
               <a:rPr lang="pl-PL" smtClean="0"/>
               <a:pPr/>
-              <a:t>21.06.2018</a:t>
+              <a:t>08.01.2019</a:t>
             </a:fld>
             <a:endParaRPr lang="pl-PL"/>
           </a:p>
@@ -2697,7 +2988,7 @@
             <a:fld id="{66221E02-25CB-4963-84BC-0813985E7D90}" type="datetimeFigureOut">
               <a:rPr lang="pl-PL" smtClean="0"/>
               <a:pPr/>
-              <a:t>21.06.2018</a:t>
+              <a:t>08.01.2019</a:t>
             </a:fld>
             <a:endParaRPr lang="pl-PL"/>
           </a:p>
@@ -2811,7 +3102,7 @@
             <a:fld id="{66221E02-25CB-4963-84BC-0813985E7D90}" type="datetimeFigureOut">
               <a:rPr lang="pl-PL" smtClean="0"/>
               <a:pPr/>
-              <a:t>21.06.2018</a:t>
+              <a:t>08.01.2019</a:t>
             </a:fld>
             <a:endParaRPr lang="pl-PL"/>
           </a:p>
@@ -2903,7 +3194,7 @@
             <a:fld id="{66221E02-25CB-4963-84BC-0813985E7D90}" type="datetimeFigureOut">
               <a:rPr lang="pl-PL" smtClean="0"/>
               <a:pPr/>
-              <a:t>21.06.2018</a:t>
+              <a:t>08.01.2019</a:t>
             </a:fld>
             <a:endParaRPr lang="pl-PL"/>
           </a:p>
@@ -3175,7 +3466,7 @@
             <a:fld id="{66221E02-25CB-4963-84BC-0813985E7D90}" type="datetimeFigureOut">
               <a:rPr lang="pl-PL" smtClean="0"/>
               <a:pPr/>
-              <a:t>21.06.2018</a:t>
+              <a:t>08.01.2019</a:t>
             </a:fld>
             <a:endParaRPr lang="pl-PL"/>
           </a:p>
@@ -3424,7 +3715,7 @@
             <a:fld id="{66221E02-25CB-4963-84BC-0813985E7D90}" type="datetimeFigureOut">
               <a:rPr lang="pl-PL" smtClean="0"/>
               <a:pPr/>
-              <a:t>21.06.2018</a:t>
+              <a:t>08.01.2019</a:t>
             </a:fld>
             <a:endParaRPr lang="pl-PL"/>
           </a:p>
@@ -3632,7 +3923,7 @@
             <a:fld id="{66221E02-25CB-4963-84BC-0813985E7D90}" type="datetimeFigureOut">
               <a:rPr lang="pl-PL" smtClean="0"/>
               <a:pPr/>
-              <a:t>21.06.2018</a:t>
+              <a:t>08.01.2019</a:t>
             </a:fld>
             <a:endParaRPr lang="pl-PL"/>
           </a:p>
@@ -4397,6 +4688,160 @@
 </p:sld>
 </file>
 
+<file path=ppt/slides/slide10.xml><?xml version="1.0" encoding="utf-8"?>
+<p:sld xmlns:a="http://schemas.openxmlformats.org/drawingml/2006/main" xmlns:r="http://schemas.openxmlformats.org/officeDocument/2006/relationships" xmlns:p="http://schemas.openxmlformats.org/presentationml/2006/main">
+  <p:cSld>
+    <p:spTree>
+      <p:nvGrpSpPr>
+        <p:cNvPr id="1" name=""/>
+        <p:cNvGrpSpPr/>
+        <p:nvPr/>
+      </p:nvGrpSpPr>
+      <p:grpSpPr>
+        <a:xfrm>
+          <a:off x="0" y="0"/>
+          <a:ext cx="0" cy="0"/>
+          <a:chOff x="0" y="0"/>
+          <a:chExt cx="0" cy="0"/>
+        </a:xfrm>
+      </p:grpSpPr>
+      <p:sp>
+        <p:nvSpPr>
+          <p:cNvPr id="2" name="Tytuł 1">
+            <a:extLst>
+              <a:ext uri="{FF2B5EF4-FFF2-40B4-BE49-F238E27FC236}">
+                <a16:creationId xmlns:a16="http://schemas.microsoft.com/office/drawing/2014/main" id="{1A5C5246-1474-4B5A-AAA4-DE1AC6177801}"/>
+              </a:ext>
+            </a:extLst>
+          </p:cNvPr>
+          <p:cNvSpPr>
+            <a:spLocks noGrp="1"/>
+          </p:cNvSpPr>
+          <p:nvPr>
+            <p:ph type="title"/>
+          </p:nvPr>
+        </p:nvSpPr>
+        <p:spPr/>
+        <p:txBody>
+          <a:bodyPr/>
+          <a:lstStyle/>
+          <a:p>
+            <a:r>
+              <a:rPr lang="pl-PL" b="1" dirty="0"/>
+              <a:t>Źródła</a:t>
+            </a:r>
+          </a:p>
+        </p:txBody>
+      </p:sp>
+      <p:sp>
+        <p:nvSpPr>
+          <p:cNvPr id="3" name="Symbol zastępczy zawartości 2">
+            <a:extLst>
+              <a:ext uri="{FF2B5EF4-FFF2-40B4-BE49-F238E27FC236}">
+                <a16:creationId xmlns:a16="http://schemas.microsoft.com/office/drawing/2014/main" id="{B5BCC172-FE4A-475D-AB0E-FBA5E65A1DFF}"/>
+              </a:ext>
+            </a:extLst>
+          </p:cNvPr>
+          <p:cNvSpPr>
+            <a:spLocks noGrp="1"/>
+          </p:cNvSpPr>
+          <p:nvPr>
+            <p:ph idx="1"/>
+          </p:nvPr>
+        </p:nvSpPr>
+        <p:spPr/>
+        <p:txBody>
+          <a:bodyPr>
+            <a:normAutofit fontScale="85000" lnSpcReduction="20000"/>
+          </a:bodyPr>
+          <a:lstStyle/>
+          <a:p>
+            <a:r>
+              <a:rPr lang="pl-PL" i="1" dirty="0">
+                <a:hlinkClick r:id="rId2"/>
+              </a:rPr>
+              <a:t>http://ilovebake.pl/2014/11/21/pierniczki-torunskie-przepis-ze-starego-zeszytu/</a:t>
+            </a:r>
+            <a:endParaRPr lang="pl-PL" i="1" dirty="0"/>
+          </a:p>
+          <a:p>
+            <a:r>
+              <a:rPr lang="pl-PL" i="1" dirty="0">
+                <a:hlinkClick r:id="rId3"/>
+              </a:rPr>
+              <a:t>http://torun1230.wikidot.com/</a:t>
+            </a:r>
+            <a:endParaRPr lang="pl-PL" i="1" dirty="0"/>
+          </a:p>
+          <a:p>
+            <a:r>
+              <a:rPr lang="pl-PL" i="1" dirty="0">
+                <a:hlinkClick r:id="rId4"/>
+              </a:rPr>
+              <a:t>https://en.wikipedia.org/wiki/File:LED_Traffic_Light.jpg</a:t>
+            </a:r>
+            <a:endParaRPr lang="pl-PL" i="1" dirty="0"/>
+          </a:p>
+          <a:p>
+            <a:r>
+              <a:rPr lang="pl-PL" i="1" dirty="0">
+                <a:hlinkClick r:id="rId5"/>
+              </a:rPr>
+              <a:t>https://pixabay.com/pl/fili%C5%BCanka-herbaty-2107599/</a:t>
+            </a:r>
+            <a:endParaRPr lang="pl-PL" i="1" dirty="0"/>
+          </a:p>
+          <a:p>
+            <a:r>
+              <a:rPr lang="pl-PL" i="1" dirty="0">
+                <a:hlinkClick r:id="rId6"/>
+              </a:rPr>
+              <a:t>https://pixabay.com/en/tea-beverage-cubes-sugar-cup-153014/</a:t>
+            </a:r>
+            <a:endParaRPr lang="pl-PL" i="1" dirty="0"/>
+          </a:p>
+          <a:p>
+            <a:r>
+              <a:rPr lang="pl-PL" i="1" dirty="0">
+                <a:hlinkClick r:id="rId7"/>
+              </a:rPr>
+              <a:t>https://pixabay.com/pl/little-green-man-%C5%9Bwiat%C5%82a-zielony-2871900/</a:t>
+            </a:r>
+            <a:endParaRPr lang="pl-PL" i="1" dirty="0"/>
+          </a:p>
+          <a:p>
+            <a:endParaRPr lang="pl-PL" i="1" dirty="0"/>
+          </a:p>
+          <a:p>
+            <a:endParaRPr lang="pl-PL" i="1" dirty="0"/>
+          </a:p>
+          <a:p>
+            <a:endParaRPr lang="pl-PL" i="1" dirty="0"/>
+          </a:p>
+          <a:p>
+            <a:endParaRPr lang="pl-PL" i="1" dirty="0"/>
+          </a:p>
+          <a:p>
+            <a:endParaRPr lang="pl-PL" i="1" dirty="0"/>
+          </a:p>
+          <a:p>
+            <a:endParaRPr lang="pl-PL" dirty="0"/>
+          </a:p>
+        </p:txBody>
+      </p:sp>
+    </p:spTree>
+    <p:extLst>
+      <p:ext uri="{BB962C8B-B14F-4D97-AF65-F5344CB8AC3E}">
+        <p14:creationId xmlns:p14="http://schemas.microsoft.com/office/powerpoint/2010/main" val="1933576036"/>
+      </p:ext>
+    </p:extLst>
+  </p:cSld>
+  <p:clrMapOvr>
+    <a:masterClrMapping/>
+  </p:clrMapOvr>
+</p:sld>
+</file>
+
 <file path=ppt/slides/slide2.xml><?xml version="1.0" encoding="utf-8"?>
 <p:sld xmlns:a="http://schemas.openxmlformats.org/drawingml/2006/main" xmlns:r="http://schemas.openxmlformats.org/officeDocument/2006/relationships" xmlns:p="http://schemas.openxmlformats.org/presentationml/2006/main">
   <p:cSld>
@@ -5102,6 +5547,840 @@
       </p:grpSpPr>
       <p:pic>
         <p:nvPicPr>
+          <p:cNvPr id="4" name="Obraz 3" descr="Obraz zawierający jasne, ruch uliczny, zewnętrzne, sygnalizacja uliczna&#10;&#10;Opis wygenerowany przy bardzo wysokim poziomie pewności">
+            <a:extLst>
+              <a:ext uri="{FF2B5EF4-FFF2-40B4-BE49-F238E27FC236}">
+                <a16:creationId xmlns:a16="http://schemas.microsoft.com/office/drawing/2014/main" id="{7D7BABFB-5F3F-4431-AD16-EE44E64F950A}"/>
+              </a:ext>
+            </a:extLst>
+          </p:cNvPr>
+          <p:cNvPicPr>
+            <a:picLocks noChangeAspect="1"/>
+          </p:cNvPicPr>
+          <p:nvPr/>
+        </p:nvPicPr>
+        <p:blipFill rotWithShape="1">
+          <a:blip r:embed="rId3">
+            <a:extLst>
+              <a:ext uri="{28A0092B-C50C-407E-A947-70E740481C1C}">
+                <a14:useLocalDpi xmlns:a14="http://schemas.microsoft.com/office/drawing/2010/main" val="0"/>
+              </a:ext>
+              <a:ext uri="{837473B0-CC2E-450A-ABE3-18F120FF3D39}">
+                <a1611:picAttrSrcUrl xmlns:a1611="http://schemas.microsoft.com/office/drawing/2016/11/main" r:id="rId4"/>
+              </a:ext>
+            </a:extLst>
+          </a:blip>
+          <a:srcRect l="11538" r="8627"/>
+          <a:stretch/>
+        </p:blipFill>
+        <p:spPr>
+          <a:xfrm>
+            <a:off x="20" y="10"/>
+            <a:ext cx="3476673" cy="6857990"/>
+          </a:xfrm>
+          <a:prstGeom prst="rect">
+            <a:avLst/>
+          </a:prstGeom>
+          <a:effectLst/>
+        </p:spPr>
+      </p:pic>
+      <p:cxnSp>
+        <p:nvCxnSpPr>
+          <p:cNvPr id="9" name="Straight Connector 8"/>
+          <p:cNvCxnSpPr>
+            <a:cxnSpLocks noGrp="1" noRot="1" noChangeAspect="1" noMove="1" noResize="1" noEditPoints="1" noAdjustHandles="1" noChangeArrowheads="1" noChangeShapeType="1"/>
+          </p:cNvCxnSpPr>
+          <p:nvPr>
+            <p:extLst>
+              <p:ext uri="{386F3935-93C4-4BCD-93E2-E3B085C9AB24}">
+                <p16:designElem xmlns:p16="http://schemas.microsoft.com/office/powerpoint/2015/main" val="1"/>
+              </p:ext>
+            </p:extLst>
+          </p:nvPr>
+        </p:nvCxnSpPr>
+        <p:spPr>
+          <a:xfrm>
+            <a:off x="3810700" y="2115117"/>
+            <a:ext cx="4732020" cy="0"/>
+          </a:xfrm>
+          <a:prstGeom prst="line">
+            <a:avLst/>
+          </a:prstGeom>
+          <a:ln>
+            <a:solidFill>
+              <a:srgbClr val="582C25"/>
+            </a:solidFill>
+          </a:ln>
+        </p:spPr>
+        <p:style>
+          <a:lnRef idx="1">
+            <a:schemeClr val="accent1"/>
+          </a:lnRef>
+          <a:fillRef idx="0">
+            <a:schemeClr val="accent1"/>
+          </a:fillRef>
+          <a:effectRef idx="0">
+            <a:schemeClr val="accent1"/>
+          </a:effectRef>
+          <a:fontRef idx="minor">
+            <a:schemeClr val="tx1"/>
+          </a:fontRef>
+        </p:style>
+      </p:cxnSp>
+      <p:sp>
+        <p:nvSpPr>
+          <p:cNvPr id="2" name="Tytuł 1">
+            <a:extLst>
+              <a:ext uri="{FF2B5EF4-FFF2-40B4-BE49-F238E27FC236}">
+                <a16:creationId xmlns:a16="http://schemas.microsoft.com/office/drawing/2014/main" id="{9D3F7114-0071-4902-B958-44EF186FCAE9}"/>
+              </a:ext>
+            </a:extLst>
+          </p:cNvPr>
+          <p:cNvSpPr>
+            <a:spLocks noGrp="1"/>
+          </p:cNvSpPr>
+          <p:nvPr>
+            <p:ph type="title"/>
+          </p:nvPr>
+        </p:nvSpPr>
+        <p:spPr>
+          <a:xfrm>
+            <a:off x="3724072" y="629268"/>
+            <a:ext cx="4939868" cy="1286160"/>
+          </a:xfrm>
+        </p:spPr>
+        <p:txBody>
+          <a:bodyPr anchor="b">
+            <a:normAutofit fontScale="90000"/>
+          </a:bodyPr>
+          <a:lstStyle/>
+          <a:p>
+            <a:pPr>
+              <a:lnSpc>
+                <a:spcPct val="90000"/>
+              </a:lnSpc>
+            </a:pPr>
+            <a:r>
+              <a:rPr lang="pl-PL" sz="4100" b="1" dirty="0"/>
+              <a:t>Konstrukcja warunków musi być przemyślana</a:t>
+            </a:r>
+          </a:p>
+        </p:txBody>
+      </p:sp>
+      <p:sp>
+        <p:nvSpPr>
+          <p:cNvPr id="3" name="Symbol zastępczy zawartości 2">
+            <a:extLst>
+              <a:ext uri="{FF2B5EF4-FFF2-40B4-BE49-F238E27FC236}">
+                <a16:creationId xmlns:a16="http://schemas.microsoft.com/office/drawing/2014/main" id="{AAF3B534-9E96-46D3-980D-5CB2AAE9AA51}"/>
+              </a:ext>
+            </a:extLst>
+          </p:cNvPr>
+          <p:cNvSpPr>
+            <a:spLocks noGrp="1"/>
+          </p:cNvSpPr>
+          <p:nvPr>
+            <p:ph idx="1"/>
+          </p:nvPr>
+        </p:nvSpPr>
+        <p:spPr>
+          <a:xfrm>
+            <a:off x="3724073" y="2438400"/>
+            <a:ext cx="4939867" cy="3785419"/>
+          </a:xfrm>
+        </p:spPr>
+        <p:txBody>
+          <a:bodyPr>
+            <a:normAutofit/>
+          </a:bodyPr>
+          <a:lstStyle/>
+          <a:p>
+            <a:pPr marL="0" indent="0">
+              <a:buNone/>
+            </a:pPr>
+            <a:r>
+              <a:rPr lang="pl-PL" sz="2800" b="1" dirty="0"/>
+              <a:t>Jeśli</a:t>
+            </a:r>
+            <a:r>
+              <a:rPr lang="pl-PL" sz="2800" dirty="0"/>
+              <a:t> </a:t>
+            </a:r>
+            <a:r>
+              <a:rPr lang="pl-PL" sz="2800" i="1" dirty="0"/>
+              <a:t>cena &gt; 100 </a:t>
+            </a:r>
+            <a:r>
+              <a:rPr lang="pl-PL" sz="2800" i="1" dirty="0">
+                <a:solidFill>
+                  <a:srgbClr val="00B0F0"/>
+                </a:solidFill>
+              </a:rPr>
+              <a:t>„drogie”,</a:t>
+            </a:r>
+          </a:p>
+          <a:p>
+            <a:pPr marL="0" indent="0">
+              <a:buNone/>
+            </a:pPr>
+            <a:r>
+              <a:rPr lang="pl-PL" sz="2800" b="1" dirty="0"/>
+              <a:t>w przeciwnym przypadku jeśli </a:t>
+            </a:r>
+            <a:r>
+              <a:rPr lang="pl-PL" sz="2800" dirty="0"/>
+              <a:t>cena &gt; 200 </a:t>
+            </a:r>
+            <a:r>
+              <a:rPr lang="pl-PL" sz="2800" b="1" dirty="0">
+                <a:solidFill>
+                  <a:srgbClr val="C00000"/>
+                </a:solidFill>
+              </a:rPr>
+              <a:t>„bardzo drogie”,</a:t>
+            </a:r>
+          </a:p>
+          <a:p>
+            <a:pPr marL="0" indent="0">
+              <a:buNone/>
+            </a:pPr>
+            <a:r>
+              <a:rPr lang="pl-PL" sz="2800" b="1" dirty="0"/>
+              <a:t>w przeciwnym przypadku </a:t>
+            </a:r>
+            <a:r>
+              <a:rPr lang="pl-PL" sz="2800" b="1" dirty="0">
+                <a:solidFill>
+                  <a:srgbClr val="00B050"/>
+                </a:solidFill>
+              </a:rPr>
+              <a:t>„tanie”</a:t>
+            </a:r>
+          </a:p>
+          <a:p>
+            <a:endParaRPr lang="pl-PL" sz="2800" b="1" dirty="0"/>
+          </a:p>
+          <a:p>
+            <a:pPr marL="0" indent="0">
+              <a:buNone/>
+            </a:pPr>
+            <a:endParaRPr lang="pl-PL" sz="2800" dirty="0"/>
+          </a:p>
+          <a:p>
+            <a:endParaRPr lang="pl-PL" sz="2000" b="1" dirty="0"/>
+          </a:p>
+          <a:p>
+            <a:pPr marL="0" indent="0">
+              <a:buNone/>
+            </a:pPr>
+            <a:endParaRPr lang="pl-PL" sz="1700" dirty="0"/>
+          </a:p>
+        </p:txBody>
+      </p:sp>
+    </p:spTree>
+    <p:extLst>
+      <p:ext uri="{BB962C8B-B14F-4D97-AF65-F5344CB8AC3E}">
+        <p14:creationId xmlns:p14="http://schemas.microsoft.com/office/powerpoint/2010/main" val="1220209676"/>
+      </p:ext>
+    </p:extLst>
+  </p:cSld>
+  <p:clrMapOvr>
+    <a:masterClrMapping/>
+  </p:clrMapOvr>
+</p:sld>
+</file>
+
+<file path=ppt/slides/slide5.xml><?xml version="1.0" encoding="utf-8"?>
+<p:sld xmlns:a="http://schemas.openxmlformats.org/drawingml/2006/main" xmlns:r="http://schemas.openxmlformats.org/officeDocument/2006/relationships" xmlns:p="http://schemas.openxmlformats.org/presentationml/2006/main">
+  <p:cSld>
+    <p:spTree>
+      <p:nvGrpSpPr>
+        <p:cNvPr id="1" name=""/>
+        <p:cNvGrpSpPr/>
+        <p:nvPr/>
+      </p:nvGrpSpPr>
+      <p:grpSpPr>
+        <a:xfrm>
+          <a:off x="0" y="0"/>
+          <a:ext cx="0" cy="0"/>
+          <a:chOff x="0" y="0"/>
+          <a:chExt cx="0" cy="0"/>
+        </a:xfrm>
+      </p:grpSpPr>
+      <p:pic>
+        <p:nvPicPr>
+          <p:cNvPr id="4" name="Obraz 3" descr="Obraz zawierający jasne, ruch uliczny, zewnętrzne, sygnalizacja uliczna&#10;&#10;Opis wygenerowany przy bardzo wysokim poziomie pewności">
+            <a:extLst>
+              <a:ext uri="{FF2B5EF4-FFF2-40B4-BE49-F238E27FC236}">
+                <a16:creationId xmlns:a16="http://schemas.microsoft.com/office/drawing/2014/main" id="{7D7BABFB-5F3F-4431-AD16-EE44E64F950A}"/>
+              </a:ext>
+            </a:extLst>
+          </p:cNvPr>
+          <p:cNvPicPr>
+            <a:picLocks noChangeAspect="1"/>
+          </p:cNvPicPr>
+          <p:nvPr/>
+        </p:nvPicPr>
+        <p:blipFill rotWithShape="1">
+          <a:blip r:embed="rId3">
+            <a:extLst>
+              <a:ext uri="{28A0092B-C50C-407E-A947-70E740481C1C}">
+                <a14:useLocalDpi xmlns:a14="http://schemas.microsoft.com/office/drawing/2010/main" val="0"/>
+              </a:ext>
+              <a:ext uri="{837473B0-CC2E-450A-ABE3-18F120FF3D39}">
+                <a1611:picAttrSrcUrl xmlns:a1611="http://schemas.microsoft.com/office/drawing/2016/11/main" r:id="rId4"/>
+              </a:ext>
+            </a:extLst>
+          </a:blip>
+          <a:srcRect l="11538" r="8627"/>
+          <a:stretch/>
+        </p:blipFill>
+        <p:spPr>
+          <a:xfrm>
+            <a:off x="20" y="10"/>
+            <a:ext cx="3476673" cy="6857990"/>
+          </a:xfrm>
+          <a:prstGeom prst="rect">
+            <a:avLst/>
+          </a:prstGeom>
+          <a:effectLst/>
+        </p:spPr>
+      </p:pic>
+      <p:cxnSp>
+        <p:nvCxnSpPr>
+          <p:cNvPr id="9" name="Straight Connector 8"/>
+          <p:cNvCxnSpPr>
+            <a:cxnSpLocks noGrp="1" noRot="1" noChangeAspect="1" noMove="1" noResize="1" noEditPoints="1" noAdjustHandles="1" noChangeArrowheads="1" noChangeShapeType="1"/>
+          </p:cNvCxnSpPr>
+          <p:nvPr>
+            <p:extLst>
+              <p:ext uri="{386F3935-93C4-4BCD-93E2-E3B085C9AB24}">
+                <p16:designElem xmlns:p16="http://schemas.microsoft.com/office/powerpoint/2015/main" val="1"/>
+              </p:ext>
+            </p:extLst>
+          </p:nvPr>
+        </p:nvCxnSpPr>
+        <p:spPr>
+          <a:xfrm>
+            <a:off x="3810700" y="2115117"/>
+            <a:ext cx="4732020" cy="0"/>
+          </a:xfrm>
+          <a:prstGeom prst="line">
+            <a:avLst/>
+          </a:prstGeom>
+          <a:ln>
+            <a:solidFill>
+              <a:srgbClr val="582C25"/>
+            </a:solidFill>
+          </a:ln>
+        </p:spPr>
+        <p:style>
+          <a:lnRef idx="1">
+            <a:schemeClr val="accent1"/>
+          </a:lnRef>
+          <a:fillRef idx="0">
+            <a:schemeClr val="accent1"/>
+          </a:fillRef>
+          <a:effectRef idx="0">
+            <a:schemeClr val="accent1"/>
+          </a:effectRef>
+          <a:fontRef idx="minor">
+            <a:schemeClr val="tx1"/>
+          </a:fontRef>
+        </p:style>
+      </p:cxnSp>
+      <p:sp>
+        <p:nvSpPr>
+          <p:cNvPr id="2" name="Tytuł 1">
+            <a:extLst>
+              <a:ext uri="{FF2B5EF4-FFF2-40B4-BE49-F238E27FC236}">
+                <a16:creationId xmlns:a16="http://schemas.microsoft.com/office/drawing/2014/main" id="{9D3F7114-0071-4902-B958-44EF186FCAE9}"/>
+              </a:ext>
+            </a:extLst>
+          </p:cNvPr>
+          <p:cNvSpPr>
+            <a:spLocks noGrp="1"/>
+          </p:cNvSpPr>
+          <p:nvPr>
+            <p:ph type="title"/>
+          </p:nvPr>
+        </p:nvSpPr>
+        <p:spPr>
+          <a:xfrm>
+            <a:off x="3724072" y="629268"/>
+            <a:ext cx="4939868" cy="1286160"/>
+          </a:xfrm>
+        </p:spPr>
+        <p:txBody>
+          <a:bodyPr anchor="b">
+            <a:normAutofit fontScale="90000"/>
+          </a:bodyPr>
+          <a:lstStyle/>
+          <a:p>
+            <a:pPr>
+              <a:lnSpc>
+                <a:spcPct val="90000"/>
+              </a:lnSpc>
+            </a:pPr>
+            <a:r>
+              <a:rPr lang="pl-PL" sz="4100" b="1" dirty="0"/>
+              <a:t>Konstrukcja warunków musi być przemyślana</a:t>
+            </a:r>
+          </a:p>
+        </p:txBody>
+      </p:sp>
+      <p:sp>
+        <p:nvSpPr>
+          <p:cNvPr id="3" name="Symbol zastępczy zawartości 2">
+            <a:extLst>
+              <a:ext uri="{FF2B5EF4-FFF2-40B4-BE49-F238E27FC236}">
+                <a16:creationId xmlns:a16="http://schemas.microsoft.com/office/drawing/2014/main" id="{AAF3B534-9E96-46D3-980D-5CB2AAE9AA51}"/>
+              </a:ext>
+            </a:extLst>
+          </p:cNvPr>
+          <p:cNvSpPr>
+            <a:spLocks noGrp="1"/>
+          </p:cNvSpPr>
+          <p:nvPr>
+            <p:ph idx="1"/>
+          </p:nvPr>
+        </p:nvSpPr>
+        <p:spPr>
+          <a:xfrm>
+            <a:off x="3724073" y="2438400"/>
+            <a:ext cx="4939867" cy="3785419"/>
+          </a:xfrm>
+        </p:spPr>
+        <p:txBody>
+          <a:bodyPr>
+            <a:normAutofit lnSpcReduction="10000"/>
+          </a:bodyPr>
+          <a:lstStyle/>
+          <a:p>
+            <a:pPr marL="0" indent="0">
+              <a:buNone/>
+            </a:pPr>
+            <a:r>
+              <a:rPr lang="pl-PL" sz="2800" b="1" dirty="0"/>
+              <a:t>Jeśli</a:t>
+            </a:r>
+            <a:r>
+              <a:rPr lang="pl-PL" sz="2800" dirty="0"/>
+              <a:t> </a:t>
+            </a:r>
+            <a:r>
+              <a:rPr lang="pl-PL" sz="2800" i="1" dirty="0"/>
+              <a:t>cena &gt; 100 </a:t>
+            </a:r>
+            <a:r>
+              <a:rPr lang="pl-PL" sz="2800" i="1" dirty="0">
+                <a:solidFill>
+                  <a:srgbClr val="00B0F0"/>
+                </a:solidFill>
+              </a:rPr>
+              <a:t>„drogie”,</a:t>
+            </a:r>
+          </a:p>
+          <a:p>
+            <a:pPr marL="0" indent="0">
+              <a:buNone/>
+            </a:pPr>
+            <a:r>
+              <a:rPr lang="pl-PL" sz="2800" b="1" dirty="0"/>
+              <a:t>w przeciwnym przypadku jeśli </a:t>
+            </a:r>
+            <a:r>
+              <a:rPr lang="pl-PL" sz="2800" dirty="0"/>
+              <a:t>cena &gt; 200 </a:t>
+            </a:r>
+            <a:r>
+              <a:rPr lang="pl-PL" sz="2800" b="1" dirty="0">
+                <a:solidFill>
+                  <a:srgbClr val="C00000"/>
+                </a:solidFill>
+              </a:rPr>
+              <a:t>„bardzo drogie”,</a:t>
+            </a:r>
+          </a:p>
+          <a:p>
+            <a:pPr marL="0" indent="0">
+              <a:buNone/>
+            </a:pPr>
+            <a:r>
+              <a:rPr lang="pl-PL" sz="2800" b="1" dirty="0"/>
+              <a:t>w przeciwnym przypadku </a:t>
+            </a:r>
+            <a:r>
+              <a:rPr lang="pl-PL" sz="2800" b="1" dirty="0">
+                <a:solidFill>
+                  <a:srgbClr val="00B050"/>
+                </a:solidFill>
+              </a:rPr>
+              <a:t>„tanie”</a:t>
+            </a:r>
+          </a:p>
+          <a:p>
+            <a:endParaRPr lang="pl-PL" sz="2800" b="1" dirty="0"/>
+          </a:p>
+          <a:p>
+            <a:pPr marL="0" indent="0">
+              <a:buNone/>
+            </a:pPr>
+            <a:r>
+              <a:rPr lang="pl-PL" sz="2800" dirty="0"/>
+              <a:t>Nigdy nie otrzymamy wyniku „bardzo drogie”</a:t>
+            </a:r>
+          </a:p>
+          <a:p>
+            <a:endParaRPr lang="pl-PL" sz="2000" b="1" dirty="0"/>
+          </a:p>
+          <a:p>
+            <a:pPr marL="0" indent="0">
+              <a:buNone/>
+            </a:pPr>
+            <a:endParaRPr lang="pl-PL" sz="1700" dirty="0"/>
+          </a:p>
+        </p:txBody>
+      </p:sp>
+      <p:sp>
+        <p:nvSpPr>
+          <p:cNvPr id="5" name="pole tekstowe 4">
+            <a:extLst>
+              <a:ext uri="{FF2B5EF4-FFF2-40B4-BE49-F238E27FC236}">
+                <a16:creationId xmlns:a16="http://schemas.microsoft.com/office/drawing/2014/main" id="{63ECBFD5-2387-FE45-9515-499822B7FD9C}"/>
+              </a:ext>
+            </a:extLst>
+          </p:cNvPr>
+          <p:cNvSpPr txBox="1"/>
+          <p:nvPr/>
+        </p:nvSpPr>
+        <p:spPr>
+          <a:xfrm>
+            <a:off x="8325353" y="3068960"/>
+            <a:ext cx="434734" cy="1015663"/>
+          </a:xfrm>
+          <a:prstGeom prst="rect">
+            <a:avLst/>
+          </a:prstGeom>
+          <a:noFill/>
+        </p:spPr>
+        <p:txBody>
+          <a:bodyPr wrap="none" rtlCol="0">
+            <a:spAutoFit/>
+          </a:bodyPr>
+          <a:lstStyle/>
+          <a:p>
+            <a:r>
+              <a:rPr lang="pl-PL" sz="6000" b="1" dirty="0">
+                <a:solidFill>
+                  <a:srgbClr val="C00000"/>
+                </a:solidFill>
+              </a:rPr>
+              <a:t>!</a:t>
+            </a:r>
+            <a:endParaRPr lang="pl-PL" b="1" dirty="0">
+              <a:solidFill>
+                <a:srgbClr val="C00000"/>
+              </a:solidFill>
+            </a:endParaRPr>
+          </a:p>
+        </p:txBody>
+      </p:sp>
+    </p:spTree>
+    <p:extLst>
+      <p:ext uri="{BB962C8B-B14F-4D97-AF65-F5344CB8AC3E}">
+        <p14:creationId xmlns:p14="http://schemas.microsoft.com/office/powerpoint/2010/main" val="3765864463"/>
+      </p:ext>
+    </p:extLst>
+  </p:cSld>
+  <p:clrMapOvr>
+    <a:masterClrMapping/>
+  </p:clrMapOvr>
+</p:sld>
+</file>
+
+<file path=ppt/slides/slide6.xml><?xml version="1.0" encoding="utf-8"?>
+<p:sld xmlns:a="http://schemas.openxmlformats.org/drawingml/2006/main" xmlns:r="http://schemas.openxmlformats.org/officeDocument/2006/relationships" xmlns:p="http://schemas.openxmlformats.org/presentationml/2006/main">
+  <p:cSld>
+    <p:spTree>
+      <p:nvGrpSpPr>
+        <p:cNvPr id="1" name=""/>
+        <p:cNvGrpSpPr/>
+        <p:nvPr/>
+      </p:nvGrpSpPr>
+      <p:grpSpPr>
+        <a:xfrm>
+          <a:off x="0" y="0"/>
+          <a:ext cx="0" cy="0"/>
+          <a:chOff x="0" y="0"/>
+          <a:chExt cx="0" cy="0"/>
+        </a:xfrm>
+      </p:grpSpPr>
+      <p:pic>
+        <p:nvPicPr>
+          <p:cNvPr id="4" name="Obraz 3" descr="Obraz zawierający jasne, ruch uliczny, zewnętrzne, sygnalizacja uliczna&#10;&#10;Opis wygenerowany przy bardzo wysokim poziomie pewności">
+            <a:extLst>
+              <a:ext uri="{FF2B5EF4-FFF2-40B4-BE49-F238E27FC236}">
+                <a16:creationId xmlns:a16="http://schemas.microsoft.com/office/drawing/2014/main" id="{7D7BABFB-5F3F-4431-AD16-EE44E64F950A}"/>
+              </a:ext>
+            </a:extLst>
+          </p:cNvPr>
+          <p:cNvPicPr>
+            <a:picLocks noChangeAspect="1"/>
+          </p:cNvPicPr>
+          <p:nvPr/>
+        </p:nvPicPr>
+        <p:blipFill rotWithShape="1">
+          <a:blip r:embed="rId3">
+            <a:extLst>
+              <a:ext uri="{28A0092B-C50C-407E-A947-70E740481C1C}">
+                <a14:useLocalDpi xmlns:a14="http://schemas.microsoft.com/office/drawing/2010/main" val="0"/>
+              </a:ext>
+              <a:ext uri="{837473B0-CC2E-450A-ABE3-18F120FF3D39}">
+                <a1611:picAttrSrcUrl xmlns:a1611="http://schemas.microsoft.com/office/drawing/2016/11/main" r:id="rId4"/>
+              </a:ext>
+            </a:extLst>
+          </a:blip>
+          <a:srcRect l="11538" r="8627"/>
+          <a:stretch/>
+        </p:blipFill>
+        <p:spPr>
+          <a:xfrm>
+            <a:off x="20" y="10"/>
+            <a:ext cx="3476673" cy="6857990"/>
+          </a:xfrm>
+          <a:prstGeom prst="rect">
+            <a:avLst/>
+          </a:prstGeom>
+          <a:effectLst/>
+        </p:spPr>
+      </p:pic>
+      <p:cxnSp>
+        <p:nvCxnSpPr>
+          <p:cNvPr id="9" name="Straight Connector 8"/>
+          <p:cNvCxnSpPr>
+            <a:cxnSpLocks noGrp="1" noRot="1" noChangeAspect="1" noMove="1" noResize="1" noEditPoints="1" noAdjustHandles="1" noChangeArrowheads="1" noChangeShapeType="1"/>
+          </p:cNvCxnSpPr>
+          <p:nvPr>
+            <p:extLst>
+              <p:ext uri="{386F3935-93C4-4BCD-93E2-E3B085C9AB24}">
+                <p16:designElem xmlns:p16="http://schemas.microsoft.com/office/powerpoint/2015/main" val="1"/>
+              </p:ext>
+            </p:extLst>
+          </p:nvPr>
+        </p:nvCxnSpPr>
+        <p:spPr>
+          <a:xfrm>
+            <a:off x="3810700" y="2115117"/>
+            <a:ext cx="4732020" cy="0"/>
+          </a:xfrm>
+          <a:prstGeom prst="line">
+            <a:avLst/>
+          </a:prstGeom>
+          <a:ln>
+            <a:solidFill>
+              <a:srgbClr val="582C25"/>
+            </a:solidFill>
+          </a:ln>
+        </p:spPr>
+        <p:style>
+          <a:lnRef idx="1">
+            <a:schemeClr val="accent1"/>
+          </a:lnRef>
+          <a:fillRef idx="0">
+            <a:schemeClr val="accent1"/>
+          </a:fillRef>
+          <a:effectRef idx="0">
+            <a:schemeClr val="accent1"/>
+          </a:effectRef>
+          <a:fontRef idx="minor">
+            <a:schemeClr val="tx1"/>
+          </a:fontRef>
+        </p:style>
+      </p:cxnSp>
+      <p:sp>
+        <p:nvSpPr>
+          <p:cNvPr id="2" name="Tytuł 1">
+            <a:extLst>
+              <a:ext uri="{FF2B5EF4-FFF2-40B4-BE49-F238E27FC236}">
+                <a16:creationId xmlns:a16="http://schemas.microsoft.com/office/drawing/2014/main" id="{9D3F7114-0071-4902-B958-44EF186FCAE9}"/>
+              </a:ext>
+            </a:extLst>
+          </p:cNvPr>
+          <p:cNvSpPr>
+            <a:spLocks noGrp="1"/>
+          </p:cNvSpPr>
+          <p:nvPr>
+            <p:ph type="title"/>
+          </p:nvPr>
+        </p:nvSpPr>
+        <p:spPr>
+          <a:xfrm>
+            <a:off x="3724072" y="629268"/>
+            <a:ext cx="4939868" cy="1286160"/>
+          </a:xfrm>
+        </p:spPr>
+        <p:txBody>
+          <a:bodyPr anchor="b">
+            <a:normAutofit fontScale="90000"/>
+          </a:bodyPr>
+          <a:lstStyle/>
+          <a:p>
+            <a:pPr>
+              <a:lnSpc>
+                <a:spcPct val="90000"/>
+              </a:lnSpc>
+            </a:pPr>
+            <a:r>
+              <a:rPr lang="pl-PL" sz="4100" b="1" dirty="0"/>
+              <a:t>Konstrukcja warunków musi być przemyślana</a:t>
+            </a:r>
+          </a:p>
+        </p:txBody>
+      </p:sp>
+      <p:sp>
+        <p:nvSpPr>
+          <p:cNvPr id="3" name="Symbol zastępczy zawartości 2">
+            <a:extLst>
+              <a:ext uri="{FF2B5EF4-FFF2-40B4-BE49-F238E27FC236}">
+                <a16:creationId xmlns:a16="http://schemas.microsoft.com/office/drawing/2014/main" id="{AAF3B534-9E96-46D3-980D-5CB2AAE9AA51}"/>
+              </a:ext>
+            </a:extLst>
+          </p:cNvPr>
+          <p:cNvSpPr>
+            <a:spLocks noGrp="1"/>
+          </p:cNvSpPr>
+          <p:nvPr>
+            <p:ph idx="1"/>
+          </p:nvPr>
+        </p:nvSpPr>
+        <p:spPr>
+          <a:xfrm>
+            <a:off x="3724073" y="2438400"/>
+            <a:ext cx="4939867" cy="3785419"/>
+          </a:xfrm>
+        </p:spPr>
+        <p:txBody>
+          <a:bodyPr>
+            <a:normAutofit/>
+          </a:bodyPr>
+          <a:lstStyle/>
+          <a:p>
+            <a:pPr marL="0" indent="0">
+              <a:buNone/>
+            </a:pPr>
+            <a:r>
+              <a:rPr lang="pl-PL" sz="2800" b="1" dirty="0"/>
+              <a:t>Jeśli</a:t>
+            </a:r>
+            <a:r>
+              <a:rPr lang="pl-PL" sz="2800" dirty="0"/>
+              <a:t> cena &gt; 200 </a:t>
+            </a:r>
+            <a:r>
+              <a:rPr lang="pl-PL" sz="2800" b="1" dirty="0">
+                <a:solidFill>
+                  <a:srgbClr val="C00000"/>
+                </a:solidFill>
+              </a:rPr>
+              <a:t>„bardzo drogie”, </a:t>
+            </a:r>
+            <a:endParaRPr lang="pl-PL" sz="2800" i="1" dirty="0">
+              <a:solidFill>
+                <a:srgbClr val="00B0F0"/>
+              </a:solidFill>
+            </a:endParaRPr>
+          </a:p>
+          <a:p>
+            <a:pPr marL="0" indent="0">
+              <a:buNone/>
+            </a:pPr>
+            <a:r>
+              <a:rPr lang="pl-PL" sz="2800" b="1" dirty="0"/>
+              <a:t>w przeciwnym przypadku jeśli </a:t>
+            </a:r>
+            <a:r>
+              <a:rPr lang="pl-PL" sz="2800" i="1" dirty="0"/>
+              <a:t>cena &gt; 100 </a:t>
+            </a:r>
+            <a:r>
+              <a:rPr lang="pl-PL" sz="2800" i="1" dirty="0">
+                <a:solidFill>
+                  <a:srgbClr val="00B0F0"/>
+                </a:solidFill>
+              </a:rPr>
+              <a:t>„drogie”, </a:t>
+            </a:r>
+          </a:p>
+          <a:p>
+            <a:pPr marL="0" indent="0">
+              <a:buNone/>
+            </a:pPr>
+            <a:r>
+              <a:rPr lang="pl-PL" sz="2800" b="1" dirty="0"/>
+              <a:t>w przeciwnym przypadku </a:t>
+            </a:r>
+            <a:r>
+              <a:rPr lang="pl-PL" sz="2800" b="1" dirty="0">
+                <a:solidFill>
+                  <a:srgbClr val="00B050"/>
+                </a:solidFill>
+              </a:rPr>
+              <a:t>„tanie”</a:t>
+            </a:r>
+          </a:p>
+          <a:p>
+            <a:endParaRPr lang="pl-PL" sz="2800" b="1" dirty="0"/>
+          </a:p>
+          <a:p>
+            <a:pPr marL="0" indent="0">
+              <a:buNone/>
+            </a:pPr>
+            <a:endParaRPr lang="pl-PL" sz="2800" dirty="0"/>
+          </a:p>
+          <a:p>
+            <a:endParaRPr lang="pl-PL" sz="2000" b="1" dirty="0"/>
+          </a:p>
+          <a:p>
+            <a:pPr marL="0" indent="0">
+              <a:buNone/>
+            </a:pPr>
+            <a:endParaRPr lang="pl-PL" sz="1700" dirty="0"/>
+          </a:p>
+        </p:txBody>
+      </p:sp>
+    </p:spTree>
+    <p:extLst>
+      <p:ext uri="{BB962C8B-B14F-4D97-AF65-F5344CB8AC3E}">
+        <p14:creationId xmlns:p14="http://schemas.microsoft.com/office/powerpoint/2010/main" val="691437719"/>
+      </p:ext>
+    </p:extLst>
+  </p:cSld>
+  <p:clrMapOvr>
+    <a:masterClrMapping/>
+  </p:clrMapOvr>
+</p:sld>
+</file>
+
+<file path=ppt/slides/slide7.xml><?xml version="1.0" encoding="utf-8"?>
+<p:sld xmlns:a="http://schemas.openxmlformats.org/drawingml/2006/main" xmlns:r="http://schemas.openxmlformats.org/officeDocument/2006/relationships" xmlns:p="http://schemas.openxmlformats.org/presentationml/2006/main">
+  <p:cSld>
+    <p:spTree>
+      <p:nvGrpSpPr>
+        <p:cNvPr id="1" name=""/>
+        <p:cNvGrpSpPr/>
+        <p:nvPr/>
+      </p:nvGrpSpPr>
+      <p:grpSpPr>
+        <a:xfrm>
+          <a:off x="0" y="0"/>
+          <a:ext cx="0" cy="0"/>
+          <a:chOff x="0" y="0"/>
+          <a:chExt cx="0" cy="0"/>
+        </a:xfrm>
+      </p:grpSpPr>
+      <p:pic>
+        <p:nvPicPr>
           <p:cNvPr id="6" name="Obraz 5" descr="Obraz zawierający kubek, kawa, stół, siedzi&#10;&#10;Opis wygenerowany przy bardzo wysokim poziomie pewności">
             <a:extLst>
               <a:ext uri="{FF2B5EF4-FFF2-40B4-BE49-F238E27FC236}">
@@ -5322,7 +6601,7 @@
 </p:sld>
 </file>
 
-<file path=ppt/slides/slide5.xml><?xml version="1.0" encoding="utf-8"?>
+<file path=ppt/slides/slide8.xml><?xml version="1.0" encoding="utf-8"?>
 <p:sld xmlns:a="http://schemas.openxmlformats.org/drawingml/2006/main" xmlns:r="http://schemas.openxmlformats.org/officeDocument/2006/relationships" xmlns:p="http://schemas.openxmlformats.org/presentationml/2006/main">
   <p:cSld>
     <p:spTree>
@@ -5573,7 +6852,7 @@
 </p:sld>
 </file>
 
-<file path=ppt/slides/slide6.xml><?xml version="1.0" encoding="utf-8"?>
+<file path=ppt/slides/slide9.xml><?xml version="1.0" encoding="utf-8"?>
 <p:sld xmlns:a="http://schemas.openxmlformats.org/drawingml/2006/main" xmlns:r="http://schemas.openxmlformats.org/officeDocument/2006/relationships" xmlns:p="http://schemas.openxmlformats.org/presentationml/2006/main">
   <p:cSld>
     <p:spTree>
@@ -5872,160 +7151,6 @@
     <p:extLst>
       <p:ext uri="{BB962C8B-B14F-4D97-AF65-F5344CB8AC3E}">
         <p14:creationId xmlns:p14="http://schemas.microsoft.com/office/powerpoint/2010/main" val="2879960551"/>
-      </p:ext>
-    </p:extLst>
-  </p:cSld>
-  <p:clrMapOvr>
-    <a:masterClrMapping/>
-  </p:clrMapOvr>
-</p:sld>
-</file>
-
-<file path=ppt/slides/slide7.xml><?xml version="1.0" encoding="utf-8"?>
-<p:sld xmlns:a="http://schemas.openxmlformats.org/drawingml/2006/main" xmlns:r="http://schemas.openxmlformats.org/officeDocument/2006/relationships" xmlns:p="http://schemas.openxmlformats.org/presentationml/2006/main">
-  <p:cSld>
-    <p:spTree>
-      <p:nvGrpSpPr>
-        <p:cNvPr id="1" name=""/>
-        <p:cNvGrpSpPr/>
-        <p:nvPr/>
-      </p:nvGrpSpPr>
-      <p:grpSpPr>
-        <a:xfrm>
-          <a:off x="0" y="0"/>
-          <a:ext cx="0" cy="0"/>
-          <a:chOff x="0" y="0"/>
-          <a:chExt cx="0" cy="0"/>
-        </a:xfrm>
-      </p:grpSpPr>
-      <p:sp>
-        <p:nvSpPr>
-          <p:cNvPr id="2" name="Tytuł 1">
-            <a:extLst>
-              <a:ext uri="{FF2B5EF4-FFF2-40B4-BE49-F238E27FC236}">
-                <a16:creationId xmlns:a16="http://schemas.microsoft.com/office/drawing/2014/main" id="{1A5C5246-1474-4B5A-AAA4-DE1AC6177801}"/>
-              </a:ext>
-            </a:extLst>
-          </p:cNvPr>
-          <p:cNvSpPr>
-            <a:spLocks noGrp="1"/>
-          </p:cNvSpPr>
-          <p:nvPr>
-            <p:ph type="title"/>
-          </p:nvPr>
-        </p:nvSpPr>
-        <p:spPr/>
-        <p:txBody>
-          <a:bodyPr/>
-          <a:lstStyle/>
-          <a:p>
-            <a:r>
-              <a:rPr lang="pl-PL" b="1" dirty="0"/>
-              <a:t>Źródła</a:t>
-            </a:r>
-          </a:p>
-        </p:txBody>
-      </p:sp>
-      <p:sp>
-        <p:nvSpPr>
-          <p:cNvPr id="3" name="Symbol zastępczy zawartości 2">
-            <a:extLst>
-              <a:ext uri="{FF2B5EF4-FFF2-40B4-BE49-F238E27FC236}">
-                <a16:creationId xmlns:a16="http://schemas.microsoft.com/office/drawing/2014/main" id="{B5BCC172-FE4A-475D-AB0E-FBA5E65A1DFF}"/>
-              </a:ext>
-            </a:extLst>
-          </p:cNvPr>
-          <p:cNvSpPr>
-            <a:spLocks noGrp="1"/>
-          </p:cNvSpPr>
-          <p:nvPr>
-            <p:ph idx="1"/>
-          </p:nvPr>
-        </p:nvSpPr>
-        <p:spPr/>
-        <p:txBody>
-          <a:bodyPr>
-            <a:normAutofit fontScale="85000" lnSpcReduction="20000"/>
-          </a:bodyPr>
-          <a:lstStyle/>
-          <a:p>
-            <a:r>
-              <a:rPr lang="pl-PL" i="1" dirty="0">
-                <a:hlinkClick r:id="rId2"/>
-              </a:rPr>
-              <a:t>http://ilovebake.pl/2014/11/21/pierniczki-torunskie-przepis-ze-starego-zeszytu/</a:t>
-            </a:r>
-            <a:endParaRPr lang="pl-PL" i="1" dirty="0"/>
-          </a:p>
-          <a:p>
-            <a:r>
-              <a:rPr lang="pl-PL" i="1" dirty="0">
-                <a:hlinkClick r:id="rId3"/>
-              </a:rPr>
-              <a:t>http://torun1230.wikidot.com/</a:t>
-            </a:r>
-            <a:endParaRPr lang="pl-PL" i="1" dirty="0"/>
-          </a:p>
-          <a:p>
-            <a:r>
-              <a:rPr lang="pl-PL" i="1" dirty="0">
-                <a:hlinkClick r:id="rId4"/>
-              </a:rPr>
-              <a:t>https://en.wikipedia.org/wiki/File:LED_Traffic_Light.jpg</a:t>
-            </a:r>
-            <a:endParaRPr lang="pl-PL" i="1" dirty="0"/>
-          </a:p>
-          <a:p>
-            <a:r>
-              <a:rPr lang="pl-PL" i="1" dirty="0">
-                <a:hlinkClick r:id="rId5"/>
-              </a:rPr>
-              <a:t>https://pixabay.com/pl/fili%C5%BCanka-herbaty-2107599/</a:t>
-            </a:r>
-            <a:endParaRPr lang="pl-PL" i="1" dirty="0"/>
-          </a:p>
-          <a:p>
-            <a:r>
-              <a:rPr lang="pl-PL" i="1" dirty="0">
-                <a:hlinkClick r:id="rId6"/>
-              </a:rPr>
-              <a:t>https://pixabay.com/en/tea-beverage-cubes-sugar-cup-153014/</a:t>
-            </a:r>
-            <a:endParaRPr lang="pl-PL" i="1" dirty="0"/>
-          </a:p>
-          <a:p>
-            <a:r>
-              <a:rPr lang="pl-PL" i="1" dirty="0">
-                <a:hlinkClick r:id="rId7"/>
-              </a:rPr>
-              <a:t>https://pixabay.com/pl/little-green-man-%C5%9Bwiat%C5%82a-zielony-2871900/</a:t>
-            </a:r>
-            <a:endParaRPr lang="pl-PL" i="1" dirty="0"/>
-          </a:p>
-          <a:p>
-            <a:endParaRPr lang="pl-PL" i="1" dirty="0"/>
-          </a:p>
-          <a:p>
-            <a:endParaRPr lang="pl-PL" i="1" dirty="0"/>
-          </a:p>
-          <a:p>
-            <a:endParaRPr lang="pl-PL" i="1" dirty="0"/>
-          </a:p>
-          <a:p>
-            <a:endParaRPr lang="pl-PL" i="1" dirty="0"/>
-          </a:p>
-          <a:p>
-            <a:endParaRPr lang="pl-PL" i="1" dirty="0"/>
-          </a:p>
-          <a:p>
-            <a:endParaRPr lang="pl-PL" dirty="0"/>
-          </a:p>
-        </p:txBody>
-      </p:sp>
-    </p:spTree>
-    <p:extLst>
-      <p:ext uri="{BB962C8B-B14F-4D97-AF65-F5344CB8AC3E}">
-        <p14:creationId xmlns:p14="http://schemas.microsoft.com/office/powerpoint/2010/main" val="1933576036"/>
       </p:ext>
     </p:extLst>
   </p:cSld>

</xml_diff>